<commit_message>
Signed-off-by: liyi002  <liyi002@bitbucket.org> 2222
</commit_message>
<xml_diff>
--- a/Papers/ImageFusion/images/EMMA.pptx
+++ b/Papers/ImageFusion/images/EMMA.pptx
@@ -199,7 +199,7 @@
           <a:p>
             <a:fld id="{730F7C05-AD7F-4FFA-A0C0-1536BA5A251F}" type="datetimeFigureOut">
               <a:rPr lang="zh-CN" altLang="en-US" smtClean="0"/>
-              <a:t>2025/7/12</a:t>
+              <a:t>2025/8/1</a:t>
             </a:fld>
             <a:endParaRPr lang="zh-CN" altLang="en-US"/>
           </a:p>
@@ -263,38 +263,37 @@
           <a:p>
             <a:pPr lvl="0"/>
             <a:r>
-              <a:rPr lang="zh-CN" altLang="en-US" smtClean="0"/>
+              <a:rPr lang="zh-CN" altLang="en-US"/>
               <a:t>编辑母版文本样式</a:t>
             </a:r>
           </a:p>
           <a:p>
             <a:pPr lvl="1"/>
             <a:r>
-              <a:rPr lang="zh-CN" altLang="en-US" smtClean="0"/>
+              <a:rPr lang="zh-CN" altLang="en-US"/>
               <a:t>第二级</a:t>
             </a:r>
           </a:p>
           <a:p>
             <a:pPr lvl="2"/>
             <a:r>
-              <a:rPr lang="zh-CN" altLang="en-US" smtClean="0"/>
+              <a:rPr lang="zh-CN" altLang="en-US"/>
               <a:t>第三级</a:t>
             </a:r>
           </a:p>
           <a:p>
             <a:pPr lvl="3"/>
             <a:r>
-              <a:rPr lang="zh-CN" altLang="en-US" smtClean="0"/>
+              <a:rPr lang="zh-CN" altLang="en-US"/>
               <a:t>第四级</a:t>
             </a:r>
           </a:p>
           <a:p>
             <a:pPr lvl="4"/>
             <a:r>
-              <a:rPr lang="zh-CN" altLang="en-US" smtClean="0"/>
+              <a:rPr lang="zh-CN" altLang="en-US"/>
               <a:t>第五级</a:t>
             </a:r>
-            <a:endParaRPr lang="zh-CN" altLang="en-US"/>
           </a:p>
         </p:txBody>
       </p:sp>
@@ -688,10 +687,9 @@
           </a:lstStyle>
           <a:p>
             <a:r>
-              <a:rPr lang="zh-CN" altLang="en-US" smtClean="0"/>
+              <a:rPr lang="zh-CN" altLang="en-US"/>
               <a:t>单击此处编辑母版标题样式</a:t>
             </a:r>
-            <a:endParaRPr lang="zh-CN" altLang="en-US"/>
           </a:p>
         </p:txBody>
       </p:sp>
@@ -753,10 +751,9 @@
           </a:lstStyle>
           <a:p>
             <a:r>
-              <a:rPr lang="zh-CN" altLang="en-US" smtClean="0"/>
+              <a:rPr lang="zh-CN" altLang="en-US"/>
               <a:t>单击以编辑母版副标题样式</a:t>
             </a:r>
-            <a:endParaRPr lang="zh-CN" altLang="en-US"/>
           </a:p>
         </p:txBody>
       </p:sp>
@@ -777,7 +774,7 @@
           <a:p>
             <a:fld id="{978008A0-1351-474F-B2A3-B5A922791B5E}" type="datetimeFigureOut">
               <a:rPr lang="zh-CN" altLang="en-US" smtClean="0"/>
-              <a:t>2025/7/12</a:t>
+              <a:t>2025/8/1</a:t>
             </a:fld>
             <a:endParaRPr lang="zh-CN" altLang="en-US"/>
           </a:p>
@@ -871,10 +868,9 @@
           <a:lstStyle/>
           <a:p>
             <a:r>
-              <a:rPr lang="zh-CN" altLang="en-US" smtClean="0"/>
+              <a:rPr lang="zh-CN" altLang="en-US"/>
               <a:t>单击此处编辑母版标题样式</a:t>
             </a:r>
-            <a:endParaRPr lang="zh-CN" altLang="en-US"/>
           </a:p>
         </p:txBody>
       </p:sp>
@@ -895,38 +891,37 @@
           <a:p>
             <a:pPr lvl="0"/>
             <a:r>
-              <a:rPr lang="zh-CN" altLang="en-US" smtClean="0"/>
+              <a:rPr lang="zh-CN" altLang="en-US"/>
               <a:t>编辑母版文本样式</a:t>
             </a:r>
           </a:p>
           <a:p>
             <a:pPr lvl="1"/>
             <a:r>
-              <a:rPr lang="zh-CN" altLang="en-US" smtClean="0"/>
+              <a:rPr lang="zh-CN" altLang="en-US"/>
               <a:t>第二级</a:t>
             </a:r>
           </a:p>
           <a:p>
             <a:pPr lvl="2"/>
             <a:r>
-              <a:rPr lang="zh-CN" altLang="en-US" smtClean="0"/>
+              <a:rPr lang="zh-CN" altLang="en-US"/>
               <a:t>第三级</a:t>
             </a:r>
           </a:p>
           <a:p>
             <a:pPr lvl="3"/>
             <a:r>
-              <a:rPr lang="zh-CN" altLang="en-US" smtClean="0"/>
+              <a:rPr lang="zh-CN" altLang="en-US"/>
               <a:t>第四级</a:t>
             </a:r>
           </a:p>
           <a:p>
             <a:pPr lvl="4"/>
             <a:r>
-              <a:rPr lang="zh-CN" altLang="en-US" smtClean="0"/>
+              <a:rPr lang="zh-CN" altLang="en-US"/>
               <a:t>第五级</a:t>
             </a:r>
-            <a:endParaRPr lang="zh-CN" altLang="en-US"/>
           </a:p>
         </p:txBody>
       </p:sp>
@@ -947,7 +942,7 @@
           <a:p>
             <a:fld id="{978008A0-1351-474F-B2A3-B5A922791B5E}" type="datetimeFigureOut">
               <a:rPr lang="zh-CN" altLang="en-US" smtClean="0"/>
-              <a:t>2025/7/12</a:t>
+              <a:t>2025/8/1</a:t>
             </a:fld>
             <a:endParaRPr lang="zh-CN" altLang="en-US"/>
           </a:p>
@@ -1046,10 +1041,9 @@
           <a:lstStyle/>
           <a:p>
             <a:r>
-              <a:rPr lang="zh-CN" altLang="en-US" smtClean="0"/>
+              <a:rPr lang="zh-CN" altLang="en-US"/>
               <a:t>单击此处编辑母版标题样式</a:t>
             </a:r>
-            <a:endParaRPr lang="zh-CN" altLang="en-US"/>
           </a:p>
         </p:txBody>
       </p:sp>
@@ -1075,38 +1069,37 @@
           <a:p>
             <a:pPr lvl="0"/>
             <a:r>
-              <a:rPr lang="zh-CN" altLang="en-US" smtClean="0"/>
+              <a:rPr lang="zh-CN" altLang="en-US"/>
               <a:t>编辑母版文本样式</a:t>
             </a:r>
           </a:p>
           <a:p>
             <a:pPr lvl="1"/>
             <a:r>
-              <a:rPr lang="zh-CN" altLang="en-US" smtClean="0"/>
+              <a:rPr lang="zh-CN" altLang="en-US"/>
               <a:t>第二级</a:t>
             </a:r>
           </a:p>
           <a:p>
             <a:pPr lvl="2"/>
             <a:r>
-              <a:rPr lang="zh-CN" altLang="en-US" smtClean="0"/>
+              <a:rPr lang="zh-CN" altLang="en-US"/>
               <a:t>第三级</a:t>
             </a:r>
           </a:p>
           <a:p>
             <a:pPr lvl="3"/>
             <a:r>
-              <a:rPr lang="zh-CN" altLang="en-US" smtClean="0"/>
+              <a:rPr lang="zh-CN" altLang="en-US"/>
               <a:t>第四级</a:t>
             </a:r>
           </a:p>
           <a:p>
             <a:pPr lvl="4"/>
             <a:r>
-              <a:rPr lang="zh-CN" altLang="en-US" smtClean="0"/>
+              <a:rPr lang="zh-CN" altLang="en-US"/>
               <a:t>第五级</a:t>
             </a:r>
-            <a:endParaRPr lang="zh-CN" altLang="en-US"/>
           </a:p>
         </p:txBody>
       </p:sp>
@@ -1127,7 +1120,7 @@
           <a:p>
             <a:fld id="{978008A0-1351-474F-B2A3-B5A922791B5E}" type="datetimeFigureOut">
               <a:rPr lang="zh-CN" altLang="en-US" smtClean="0"/>
-              <a:t>2025/7/12</a:t>
+              <a:t>2025/8/1</a:t>
             </a:fld>
             <a:endParaRPr lang="zh-CN" altLang="en-US"/>
           </a:p>
@@ -1580,10 +1573,9 @@
           <a:lstStyle/>
           <a:p>
             <a:r>
-              <a:rPr lang="zh-CN" altLang="en-US" smtClean="0"/>
+              <a:rPr lang="zh-CN" altLang="en-US"/>
               <a:t>单击此处编辑母版标题样式</a:t>
             </a:r>
-            <a:endParaRPr lang="zh-CN" altLang="en-US"/>
           </a:p>
         </p:txBody>
       </p:sp>
@@ -1604,38 +1596,37 @@
           <a:p>
             <a:pPr lvl="0"/>
             <a:r>
-              <a:rPr lang="zh-CN" altLang="en-US" smtClean="0"/>
+              <a:rPr lang="zh-CN" altLang="en-US"/>
               <a:t>编辑母版文本样式</a:t>
             </a:r>
           </a:p>
           <a:p>
             <a:pPr lvl="1"/>
             <a:r>
-              <a:rPr lang="zh-CN" altLang="en-US" smtClean="0"/>
+              <a:rPr lang="zh-CN" altLang="en-US"/>
               <a:t>第二级</a:t>
             </a:r>
           </a:p>
           <a:p>
             <a:pPr lvl="2"/>
             <a:r>
-              <a:rPr lang="zh-CN" altLang="en-US" smtClean="0"/>
+              <a:rPr lang="zh-CN" altLang="en-US"/>
               <a:t>第三级</a:t>
             </a:r>
           </a:p>
           <a:p>
             <a:pPr lvl="3"/>
             <a:r>
-              <a:rPr lang="zh-CN" altLang="en-US" smtClean="0"/>
+              <a:rPr lang="zh-CN" altLang="en-US"/>
               <a:t>第四级</a:t>
             </a:r>
           </a:p>
           <a:p>
             <a:pPr lvl="4"/>
             <a:r>
-              <a:rPr lang="zh-CN" altLang="en-US" smtClean="0"/>
+              <a:rPr lang="zh-CN" altLang="en-US"/>
               <a:t>第五级</a:t>
             </a:r>
-            <a:endParaRPr lang="zh-CN" altLang="en-US"/>
           </a:p>
         </p:txBody>
       </p:sp>
@@ -1656,7 +1647,7 @@
           <a:p>
             <a:fld id="{978008A0-1351-474F-B2A3-B5A922791B5E}" type="datetimeFigureOut">
               <a:rPr lang="zh-CN" altLang="en-US" smtClean="0"/>
-              <a:t>2025/7/12</a:t>
+              <a:t>2025/8/1</a:t>
             </a:fld>
             <a:endParaRPr lang="zh-CN" altLang="en-US"/>
           </a:p>
@@ -1759,10 +1750,9 @@
           </a:lstStyle>
           <a:p>
             <a:r>
-              <a:rPr lang="zh-CN" altLang="en-US" smtClean="0"/>
+              <a:rPr lang="zh-CN" altLang="en-US"/>
               <a:t>单击此处编辑母版标题样式</a:t>
             </a:r>
-            <a:endParaRPr lang="zh-CN" altLang="en-US"/>
           </a:p>
         </p:txBody>
       </p:sp>
@@ -1879,7 +1869,7 @@
           <a:p>
             <a:pPr lvl="0"/>
             <a:r>
-              <a:rPr lang="zh-CN" altLang="en-US" smtClean="0"/>
+              <a:rPr lang="zh-CN" altLang="en-US"/>
               <a:t>编辑母版文本样式</a:t>
             </a:r>
           </a:p>
@@ -1902,7 +1892,7 @@
           <a:p>
             <a:fld id="{978008A0-1351-474F-B2A3-B5A922791B5E}" type="datetimeFigureOut">
               <a:rPr lang="zh-CN" altLang="en-US" smtClean="0"/>
-              <a:t>2025/7/12</a:t>
+              <a:t>2025/8/1</a:t>
             </a:fld>
             <a:endParaRPr lang="zh-CN" altLang="en-US"/>
           </a:p>
@@ -1996,10 +1986,9 @@
           <a:lstStyle/>
           <a:p>
             <a:r>
-              <a:rPr lang="zh-CN" altLang="en-US" smtClean="0"/>
+              <a:rPr lang="zh-CN" altLang="en-US"/>
               <a:t>单击此处编辑母版标题样式</a:t>
             </a:r>
-            <a:endParaRPr lang="zh-CN" altLang="en-US"/>
           </a:p>
         </p:txBody>
       </p:sp>
@@ -2025,38 +2014,37 @@
           <a:p>
             <a:pPr lvl="0"/>
             <a:r>
-              <a:rPr lang="zh-CN" altLang="en-US" smtClean="0"/>
+              <a:rPr lang="zh-CN" altLang="en-US"/>
               <a:t>编辑母版文本样式</a:t>
             </a:r>
           </a:p>
           <a:p>
             <a:pPr lvl="1"/>
             <a:r>
-              <a:rPr lang="zh-CN" altLang="en-US" smtClean="0"/>
+              <a:rPr lang="zh-CN" altLang="en-US"/>
               <a:t>第二级</a:t>
             </a:r>
           </a:p>
           <a:p>
             <a:pPr lvl="2"/>
             <a:r>
-              <a:rPr lang="zh-CN" altLang="en-US" smtClean="0"/>
+              <a:rPr lang="zh-CN" altLang="en-US"/>
               <a:t>第三级</a:t>
             </a:r>
           </a:p>
           <a:p>
             <a:pPr lvl="3"/>
             <a:r>
-              <a:rPr lang="zh-CN" altLang="en-US" smtClean="0"/>
+              <a:rPr lang="zh-CN" altLang="en-US"/>
               <a:t>第四级</a:t>
             </a:r>
           </a:p>
           <a:p>
             <a:pPr lvl="4"/>
             <a:r>
-              <a:rPr lang="zh-CN" altLang="en-US" smtClean="0"/>
+              <a:rPr lang="zh-CN" altLang="en-US"/>
               <a:t>第五级</a:t>
             </a:r>
-            <a:endParaRPr lang="zh-CN" altLang="en-US"/>
           </a:p>
         </p:txBody>
       </p:sp>
@@ -2082,38 +2070,37 @@
           <a:p>
             <a:pPr lvl="0"/>
             <a:r>
-              <a:rPr lang="zh-CN" altLang="en-US" smtClean="0"/>
+              <a:rPr lang="zh-CN" altLang="en-US"/>
               <a:t>编辑母版文本样式</a:t>
             </a:r>
           </a:p>
           <a:p>
             <a:pPr lvl="1"/>
             <a:r>
-              <a:rPr lang="zh-CN" altLang="en-US" smtClean="0"/>
+              <a:rPr lang="zh-CN" altLang="en-US"/>
               <a:t>第二级</a:t>
             </a:r>
           </a:p>
           <a:p>
             <a:pPr lvl="2"/>
             <a:r>
-              <a:rPr lang="zh-CN" altLang="en-US" smtClean="0"/>
+              <a:rPr lang="zh-CN" altLang="en-US"/>
               <a:t>第三级</a:t>
             </a:r>
           </a:p>
           <a:p>
             <a:pPr lvl="3"/>
             <a:r>
-              <a:rPr lang="zh-CN" altLang="en-US" smtClean="0"/>
+              <a:rPr lang="zh-CN" altLang="en-US"/>
               <a:t>第四级</a:t>
             </a:r>
           </a:p>
           <a:p>
             <a:pPr lvl="4"/>
             <a:r>
-              <a:rPr lang="zh-CN" altLang="en-US" smtClean="0"/>
+              <a:rPr lang="zh-CN" altLang="en-US"/>
               <a:t>第五级</a:t>
             </a:r>
-            <a:endParaRPr lang="zh-CN" altLang="en-US"/>
           </a:p>
         </p:txBody>
       </p:sp>
@@ -2134,7 +2121,7 @@
           <a:p>
             <a:fld id="{978008A0-1351-474F-B2A3-B5A922791B5E}" type="datetimeFigureOut">
               <a:rPr lang="zh-CN" altLang="en-US" smtClean="0"/>
-              <a:t>2025/7/12</a:t>
+              <a:t>2025/8/1</a:t>
             </a:fld>
             <a:endParaRPr lang="zh-CN" altLang="en-US"/>
           </a:p>
@@ -2233,10 +2220,9 @@
           <a:lstStyle/>
           <a:p>
             <a:r>
-              <a:rPr lang="zh-CN" altLang="en-US" smtClean="0"/>
+              <a:rPr lang="zh-CN" altLang="en-US"/>
               <a:t>单击此处编辑母版标题样式</a:t>
             </a:r>
-            <a:endParaRPr lang="zh-CN" altLang="en-US"/>
           </a:p>
         </p:txBody>
       </p:sp>
@@ -2299,7 +2285,7 @@
           <a:p>
             <a:pPr lvl="0"/>
             <a:r>
-              <a:rPr lang="zh-CN" altLang="en-US" smtClean="0"/>
+              <a:rPr lang="zh-CN" altLang="en-US"/>
               <a:t>编辑母版文本样式</a:t>
             </a:r>
           </a:p>
@@ -2327,38 +2313,37 @@
           <a:p>
             <a:pPr lvl="0"/>
             <a:r>
-              <a:rPr lang="zh-CN" altLang="en-US" smtClean="0"/>
+              <a:rPr lang="zh-CN" altLang="en-US"/>
               <a:t>编辑母版文本样式</a:t>
             </a:r>
           </a:p>
           <a:p>
             <a:pPr lvl="1"/>
             <a:r>
-              <a:rPr lang="zh-CN" altLang="en-US" smtClean="0"/>
+              <a:rPr lang="zh-CN" altLang="en-US"/>
               <a:t>第二级</a:t>
             </a:r>
           </a:p>
           <a:p>
             <a:pPr lvl="2"/>
             <a:r>
-              <a:rPr lang="zh-CN" altLang="en-US" smtClean="0"/>
+              <a:rPr lang="zh-CN" altLang="en-US"/>
               <a:t>第三级</a:t>
             </a:r>
           </a:p>
           <a:p>
             <a:pPr lvl="3"/>
             <a:r>
-              <a:rPr lang="zh-CN" altLang="en-US" smtClean="0"/>
+              <a:rPr lang="zh-CN" altLang="en-US"/>
               <a:t>第四级</a:t>
             </a:r>
           </a:p>
           <a:p>
             <a:pPr lvl="4"/>
             <a:r>
-              <a:rPr lang="zh-CN" altLang="en-US" smtClean="0"/>
+              <a:rPr lang="zh-CN" altLang="en-US"/>
               <a:t>第五级</a:t>
             </a:r>
-            <a:endParaRPr lang="zh-CN" altLang="en-US"/>
           </a:p>
         </p:txBody>
       </p:sp>
@@ -2421,7 +2406,7 @@
           <a:p>
             <a:pPr lvl="0"/>
             <a:r>
-              <a:rPr lang="zh-CN" altLang="en-US" smtClean="0"/>
+              <a:rPr lang="zh-CN" altLang="en-US"/>
               <a:t>编辑母版文本样式</a:t>
             </a:r>
           </a:p>
@@ -2449,38 +2434,37 @@
           <a:p>
             <a:pPr lvl="0"/>
             <a:r>
-              <a:rPr lang="zh-CN" altLang="en-US" smtClean="0"/>
+              <a:rPr lang="zh-CN" altLang="en-US"/>
               <a:t>编辑母版文本样式</a:t>
             </a:r>
           </a:p>
           <a:p>
             <a:pPr lvl="1"/>
             <a:r>
-              <a:rPr lang="zh-CN" altLang="en-US" smtClean="0"/>
+              <a:rPr lang="zh-CN" altLang="en-US"/>
               <a:t>第二级</a:t>
             </a:r>
           </a:p>
           <a:p>
             <a:pPr lvl="2"/>
             <a:r>
-              <a:rPr lang="zh-CN" altLang="en-US" smtClean="0"/>
+              <a:rPr lang="zh-CN" altLang="en-US"/>
               <a:t>第三级</a:t>
             </a:r>
           </a:p>
           <a:p>
             <a:pPr lvl="3"/>
             <a:r>
-              <a:rPr lang="zh-CN" altLang="en-US" smtClean="0"/>
+              <a:rPr lang="zh-CN" altLang="en-US"/>
               <a:t>第四级</a:t>
             </a:r>
           </a:p>
           <a:p>
             <a:pPr lvl="4"/>
             <a:r>
-              <a:rPr lang="zh-CN" altLang="en-US" smtClean="0"/>
+              <a:rPr lang="zh-CN" altLang="en-US"/>
               <a:t>第五级</a:t>
             </a:r>
-            <a:endParaRPr lang="zh-CN" altLang="en-US"/>
           </a:p>
         </p:txBody>
       </p:sp>
@@ -2501,7 +2485,7 @@
           <a:p>
             <a:fld id="{978008A0-1351-474F-B2A3-B5A922791B5E}" type="datetimeFigureOut">
               <a:rPr lang="zh-CN" altLang="en-US" smtClean="0"/>
-              <a:t>2025/7/12</a:t>
+              <a:t>2025/8/1</a:t>
             </a:fld>
             <a:endParaRPr lang="zh-CN" altLang="en-US"/>
           </a:p>
@@ -2595,10 +2579,9 @@
           <a:lstStyle/>
           <a:p>
             <a:r>
-              <a:rPr lang="zh-CN" altLang="en-US" smtClean="0"/>
+              <a:rPr lang="zh-CN" altLang="en-US"/>
               <a:t>单击此处编辑母版标题样式</a:t>
             </a:r>
-            <a:endParaRPr lang="zh-CN" altLang="en-US"/>
           </a:p>
         </p:txBody>
       </p:sp>
@@ -2619,7 +2602,7 @@
           <a:p>
             <a:fld id="{978008A0-1351-474F-B2A3-B5A922791B5E}" type="datetimeFigureOut">
               <a:rPr lang="zh-CN" altLang="en-US" smtClean="0"/>
-              <a:t>2025/7/12</a:t>
+              <a:t>2025/8/1</a:t>
             </a:fld>
             <a:endParaRPr lang="zh-CN" altLang="en-US"/>
           </a:p>
@@ -2714,7 +2697,7 @@
           <a:p>
             <a:fld id="{978008A0-1351-474F-B2A3-B5A922791B5E}" type="datetimeFigureOut">
               <a:rPr lang="zh-CN" altLang="en-US" smtClean="0"/>
-              <a:t>2025/7/12</a:t>
+              <a:t>2025/8/1</a:t>
             </a:fld>
             <a:endParaRPr lang="zh-CN" altLang="en-US"/>
           </a:p>
@@ -2817,10 +2800,9 @@
           </a:lstStyle>
           <a:p>
             <a:r>
-              <a:rPr lang="zh-CN" altLang="en-US" smtClean="0"/>
+              <a:rPr lang="zh-CN" altLang="en-US"/>
               <a:t>单击此处编辑母版标题样式</a:t>
             </a:r>
-            <a:endParaRPr lang="zh-CN" altLang="en-US"/>
           </a:p>
         </p:txBody>
       </p:sp>
@@ -2874,38 +2856,37 @@
           <a:p>
             <a:pPr lvl="0"/>
             <a:r>
-              <a:rPr lang="zh-CN" altLang="en-US" smtClean="0"/>
+              <a:rPr lang="zh-CN" altLang="en-US"/>
               <a:t>编辑母版文本样式</a:t>
             </a:r>
           </a:p>
           <a:p>
             <a:pPr lvl="1"/>
             <a:r>
-              <a:rPr lang="zh-CN" altLang="en-US" smtClean="0"/>
+              <a:rPr lang="zh-CN" altLang="en-US"/>
               <a:t>第二级</a:t>
             </a:r>
           </a:p>
           <a:p>
             <a:pPr lvl="2"/>
             <a:r>
-              <a:rPr lang="zh-CN" altLang="en-US" smtClean="0"/>
+              <a:rPr lang="zh-CN" altLang="en-US"/>
               <a:t>第三级</a:t>
             </a:r>
           </a:p>
           <a:p>
             <a:pPr lvl="3"/>
             <a:r>
-              <a:rPr lang="zh-CN" altLang="en-US" smtClean="0"/>
+              <a:rPr lang="zh-CN" altLang="en-US"/>
               <a:t>第四级</a:t>
             </a:r>
           </a:p>
           <a:p>
             <a:pPr lvl="4"/>
             <a:r>
-              <a:rPr lang="zh-CN" altLang="en-US" smtClean="0"/>
+              <a:rPr lang="zh-CN" altLang="en-US"/>
               <a:t>第五级</a:t>
             </a:r>
-            <a:endParaRPr lang="zh-CN" altLang="en-US"/>
           </a:p>
         </p:txBody>
       </p:sp>
@@ -2968,7 +2949,7 @@
           <a:p>
             <a:pPr lvl="0"/>
             <a:r>
-              <a:rPr lang="zh-CN" altLang="en-US" smtClean="0"/>
+              <a:rPr lang="zh-CN" altLang="en-US"/>
               <a:t>编辑母版文本样式</a:t>
             </a:r>
           </a:p>
@@ -2991,7 +2972,7 @@
           <a:p>
             <a:fld id="{978008A0-1351-474F-B2A3-B5A922791B5E}" type="datetimeFigureOut">
               <a:rPr lang="zh-CN" altLang="en-US" smtClean="0"/>
-              <a:t>2025/7/12</a:t>
+              <a:t>2025/8/1</a:t>
             </a:fld>
             <a:endParaRPr lang="zh-CN" altLang="en-US"/>
           </a:p>
@@ -3094,10 +3075,9 @@
           </a:lstStyle>
           <a:p>
             <a:r>
-              <a:rPr lang="zh-CN" altLang="en-US" smtClean="0"/>
+              <a:rPr lang="zh-CN" altLang="en-US"/>
               <a:t>单击此处编辑母版标题样式</a:t>
             </a:r>
-            <a:endParaRPr lang="zh-CN" altLang="en-US"/>
           </a:p>
         </p:txBody>
       </p:sp>
@@ -3221,7 +3201,7 @@
           <a:p>
             <a:pPr lvl="0"/>
             <a:r>
-              <a:rPr lang="zh-CN" altLang="en-US" smtClean="0"/>
+              <a:rPr lang="zh-CN" altLang="en-US"/>
               <a:t>编辑母版文本样式</a:t>
             </a:r>
           </a:p>
@@ -3244,7 +3224,7 @@
           <a:p>
             <a:fld id="{978008A0-1351-474F-B2A3-B5A922791B5E}" type="datetimeFigureOut">
               <a:rPr lang="zh-CN" altLang="en-US" smtClean="0"/>
-              <a:t>2025/7/12</a:t>
+              <a:t>2025/8/1</a:t>
             </a:fld>
             <a:endParaRPr lang="zh-CN" altLang="en-US"/>
           </a:p>
@@ -3353,10 +3333,9 @@
           <a:lstStyle/>
           <a:p>
             <a:r>
-              <a:rPr lang="zh-CN" altLang="en-US" smtClean="0"/>
+              <a:rPr lang="zh-CN" altLang="en-US"/>
               <a:t>单击此处编辑母版标题样式</a:t>
             </a:r>
-            <a:endParaRPr lang="zh-CN" altLang="en-US"/>
           </a:p>
         </p:txBody>
       </p:sp>
@@ -3387,38 +3366,37 @@
           <a:p>
             <a:pPr lvl="0"/>
             <a:r>
-              <a:rPr lang="zh-CN" altLang="en-US" smtClean="0"/>
+              <a:rPr lang="zh-CN" altLang="en-US"/>
               <a:t>编辑母版文本样式</a:t>
             </a:r>
           </a:p>
           <a:p>
             <a:pPr lvl="1"/>
             <a:r>
-              <a:rPr lang="zh-CN" altLang="en-US" smtClean="0"/>
+              <a:rPr lang="zh-CN" altLang="en-US"/>
               <a:t>第二级</a:t>
             </a:r>
           </a:p>
           <a:p>
             <a:pPr lvl="2"/>
             <a:r>
-              <a:rPr lang="zh-CN" altLang="en-US" smtClean="0"/>
+              <a:rPr lang="zh-CN" altLang="en-US"/>
               <a:t>第三级</a:t>
             </a:r>
           </a:p>
           <a:p>
             <a:pPr lvl="3"/>
             <a:r>
-              <a:rPr lang="zh-CN" altLang="en-US" smtClean="0"/>
+              <a:rPr lang="zh-CN" altLang="en-US"/>
               <a:t>第四级</a:t>
             </a:r>
           </a:p>
           <a:p>
             <a:pPr lvl="4"/>
             <a:r>
-              <a:rPr lang="zh-CN" altLang="en-US" smtClean="0"/>
+              <a:rPr lang="zh-CN" altLang="en-US"/>
               <a:t>第五级</a:t>
             </a:r>
-            <a:endParaRPr lang="zh-CN" altLang="en-US"/>
           </a:p>
         </p:txBody>
       </p:sp>
@@ -3457,7 +3435,7 @@
           <a:p>
             <a:fld id="{978008A0-1351-474F-B2A3-B5A922791B5E}" type="datetimeFigureOut">
               <a:rPr lang="zh-CN" altLang="en-US" smtClean="0"/>
-              <a:t>2025/7/12</a:t>
+              <a:t>2025/8/1</a:t>
             </a:fld>
             <a:endParaRPr lang="zh-CN" altLang="en-US"/>
           </a:p>
@@ -4107,7 +4085,7 @@
               <a:buNone/>
             </a:pPr>
             <a:r>
-              <a:rPr lang="en" dirty="0" smtClean="0"/>
+              <a:rPr lang="en" dirty="0"/>
               <a:t>HVI-Fuser</a:t>
             </a:r>
             <a:endParaRPr dirty="0"/>
@@ -4212,7 +4190,7 @@
               <a:buNone/>
             </a:pPr>
             <a:r>
-              <a:rPr lang="en" b="1" dirty="0" smtClean="0">
+              <a:rPr lang="en" b="1" dirty="0">
                 <a:latin typeface="Times New Roman"/>
                 <a:ea typeface="Times New Roman"/>
                 <a:cs typeface="Times New Roman"/>
@@ -4232,7 +4210,7 @@
               <a:buNone/>
             </a:pPr>
             <a:r>
-              <a:rPr lang="en" b="1" dirty="0" smtClean="0">
+              <a:rPr lang="en" b="1" dirty="0">
                 <a:latin typeface="Times New Roman"/>
                 <a:ea typeface="Times New Roman"/>
                 <a:cs typeface="Times New Roman"/>
@@ -4252,7 +4230,7 @@
               <a:buNone/>
             </a:pPr>
             <a:r>
-              <a:rPr lang="en" dirty="0" smtClean="0">
+              <a:rPr lang="en" dirty="0">
                 <a:latin typeface="Times New Roman"/>
                 <a:ea typeface="Times New Roman"/>
                 <a:cs typeface="Times New Roman"/>
@@ -4261,7 +4239,7 @@
               <a:t>(flip</a:t>
             </a:r>
             <a:r>
-              <a:rPr lang="zh-CN" altLang="en-US" dirty="0" smtClean="0">
+              <a:rPr lang="zh-CN" altLang="en-US" dirty="0">
                 <a:latin typeface="Times New Roman"/>
                 <a:ea typeface="Times New Roman"/>
                 <a:cs typeface="Times New Roman"/>
@@ -4270,7 +4248,7 @@
               <a:t>，</a:t>
             </a:r>
             <a:r>
-              <a:rPr lang="en" dirty="0" smtClean="0">
+              <a:rPr lang="en" dirty="0">
                 <a:latin typeface="Times New Roman"/>
                 <a:ea typeface="Times New Roman"/>
                 <a:cs typeface="Times New Roman"/>
@@ -4290,7 +4268,7 @@
               <a:buNone/>
             </a:pPr>
             <a:r>
-              <a:rPr lang="en" dirty="0" smtClean="0">
+              <a:rPr lang="en" dirty="0">
                 <a:latin typeface="Times New Roman"/>
                 <a:ea typeface="Times New Roman"/>
                 <a:cs typeface="Times New Roman"/>
@@ -4299,7 +4277,7 @@
               <a:t>translation</a:t>
             </a:r>
             <a:r>
-              <a:rPr lang="en-US" dirty="0" smtClean="0">
+              <a:rPr lang="en-US" dirty="0">
                 <a:latin typeface="Times New Roman"/>
                 <a:ea typeface="Times New Roman"/>
                 <a:cs typeface="Times New Roman"/>
@@ -4308,7 +4286,7 @@
               <a:t>…</a:t>
             </a:r>
             <a:r>
-              <a:rPr lang="en" dirty="0" smtClean="0">
+              <a:rPr lang="en" dirty="0">
                 <a:latin typeface="Times New Roman"/>
                 <a:ea typeface="Times New Roman"/>
                 <a:cs typeface="Times New Roman"/>
@@ -4440,7 +4418,7 @@
               <a:buNone/>
             </a:pPr>
             <a:r>
-              <a:rPr lang="en" dirty="0" smtClean="0">
+              <a:rPr lang="en" dirty="0">
                 <a:latin typeface="Times New Roman"/>
                 <a:ea typeface="Times New Roman"/>
                 <a:cs typeface="Times New Roman"/>
@@ -4449,7 +4427,7 @@
               <a:t>A</a:t>
             </a:r>
             <a:r>
-              <a:rPr lang="en-US" altLang="zh-CN" dirty="0" err="1" smtClean="0">
+              <a:rPr lang="en-US" altLang="zh-CN" dirty="0" err="1">
                 <a:latin typeface="Times New Roman"/>
                 <a:ea typeface="Times New Roman"/>
                 <a:cs typeface="Times New Roman"/>
@@ -4537,7 +4515,7 @@
               <a:buNone/>
             </a:pPr>
             <a:r>
-              <a:rPr lang="en" dirty="0" smtClean="0">
+              <a:rPr lang="en" dirty="0">
                 <a:latin typeface="Times New Roman"/>
                 <a:ea typeface="Times New Roman"/>
                 <a:cs typeface="Times New Roman"/>
@@ -4778,7 +4756,7 @@
               <a:buNone/>
             </a:pPr>
             <a:r>
-              <a:rPr lang="en" dirty="0" smtClean="0"/>
+              <a:rPr lang="en" dirty="0"/>
               <a:t>HVI-Fuser</a:t>
             </a:r>
             <a:endParaRPr dirty="0"/>
@@ -4974,8 +4952,8 @@
         </p:nvSpPr>
         <p:spPr>
           <a:xfrm>
-            <a:off x="7790390" y="2096653"/>
-            <a:ext cx="913200" cy="350400"/>
+            <a:off x="6830450" y="1704768"/>
+            <a:ext cx="964875" cy="342092"/>
           </a:xfrm>
           <a:prstGeom prst="rect">
             <a:avLst/>
@@ -5017,8 +4995,8 @@
         </p:nvSpPr>
         <p:spPr>
           <a:xfrm>
-            <a:off x="7790390" y="2757603"/>
-            <a:ext cx="913200" cy="350400"/>
+            <a:off x="6830450" y="2365718"/>
+            <a:ext cx="964875" cy="342092"/>
           </a:xfrm>
           <a:prstGeom prst="rect">
             <a:avLst/>
@@ -5060,8 +5038,8 @@
         </p:nvSpPr>
         <p:spPr>
           <a:xfrm>
-            <a:off x="7790390" y="3094720"/>
-            <a:ext cx="913200" cy="350400"/>
+            <a:off x="6830450" y="2702835"/>
+            <a:ext cx="964875" cy="342092"/>
           </a:xfrm>
           <a:prstGeom prst="rect">
             <a:avLst/>
@@ -5103,8 +5081,8 @@
         </p:nvSpPr>
         <p:spPr>
           <a:xfrm>
-            <a:off x="7790390" y="3418553"/>
-            <a:ext cx="913200" cy="350400"/>
+            <a:off x="6830450" y="3026668"/>
+            <a:ext cx="964875" cy="342092"/>
           </a:xfrm>
           <a:prstGeom prst="rect">
             <a:avLst/>
@@ -5146,8 +5124,8 @@
         </p:nvSpPr>
         <p:spPr>
           <a:xfrm>
-            <a:off x="7790390" y="3758336"/>
-            <a:ext cx="913200" cy="466800"/>
+            <a:off x="6830450" y="3366451"/>
+            <a:ext cx="964875" cy="455732"/>
           </a:xfrm>
           <a:prstGeom prst="rect">
             <a:avLst/>
@@ -5189,8 +5167,8 @@
         </p:nvSpPr>
         <p:spPr>
           <a:xfrm>
-            <a:off x="7790390" y="4079487"/>
-            <a:ext cx="913200" cy="350400"/>
+            <a:off x="6830450" y="3687602"/>
+            <a:ext cx="964875" cy="342092"/>
           </a:xfrm>
           <a:prstGeom prst="rect">
             <a:avLst/>
@@ -5232,8 +5210,8 @@
         </p:nvSpPr>
         <p:spPr>
           <a:xfrm>
-            <a:off x="7790390" y="2427355"/>
-            <a:ext cx="913200" cy="394800"/>
+            <a:off x="6830450" y="2035470"/>
+            <a:ext cx="964875" cy="385439"/>
           </a:xfrm>
           <a:prstGeom prst="rect">
             <a:avLst/>
@@ -5269,14 +5247,14 @@
       </p:sp>
       <p:sp>
         <p:nvSpPr>
-          <p:cNvPr id="8037" name="Google Shape;8037;p85"/>
+          <p:cNvPr id="8039" name="Google Shape;8039;p85"/>
           <p:cNvSpPr/>
           <p:nvPr/>
         </p:nvSpPr>
         <p:spPr>
           <a:xfrm>
-            <a:off x="5436178" y="685147"/>
-            <a:ext cx="475600" cy="4509600"/>
+            <a:off x="6237438" y="2559135"/>
+            <a:ext cx="423057" cy="579525"/>
           </a:xfrm>
           <a:prstGeom prst="rect">
             <a:avLst/>
@@ -5300,14 +5278,14 @@
       </p:sp>
       <p:sp>
         <p:nvSpPr>
-          <p:cNvPr id="8039" name="Google Shape;8039;p85"/>
+          <p:cNvPr id="8040" name="Google Shape;8040;p85"/>
           <p:cNvSpPr/>
           <p:nvPr/>
         </p:nvSpPr>
         <p:spPr>
           <a:xfrm>
-            <a:off x="7197378" y="2951020"/>
-            <a:ext cx="400400" cy="593600"/>
+            <a:off x="6212939" y="2661495"/>
+            <a:ext cx="71848" cy="385439"/>
           </a:xfrm>
           <a:prstGeom prst="rect">
             <a:avLst/>
@@ -5331,14 +5309,14 @@
       </p:sp>
       <p:sp>
         <p:nvSpPr>
-          <p:cNvPr id="8040" name="Google Shape;8040;p85"/>
+          <p:cNvPr id="8044" name="Google Shape;8044;p85"/>
           <p:cNvSpPr/>
           <p:nvPr/>
         </p:nvSpPr>
         <p:spPr>
           <a:xfrm>
-            <a:off x="7172878" y="3053380"/>
-            <a:ext cx="68000" cy="394800"/>
+            <a:off x="7710944" y="2611184"/>
+            <a:ext cx="502513" cy="579525"/>
           </a:xfrm>
           <a:prstGeom prst="rect">
             <a:avLst/>
@@ -5362,75 +5340,13 @@
       </p:sp>
       <p:sp>
         <p:nvSpPr>
-          <p:cNvPr id="8042" name="Google Shape;8042;p85"/>
-          <p:cNvSpPr/>
-          <p:nvPr/>
-        </p:nvSpPr>
-        <p:spPr>
-          <a:xfrm>
-            <a:off x="9658878" y="3028353"/>
-            <a:ext cx="475600" cy="630000"/>
-          </a:xfrm>
-          <a:prstGeom prst="rect">
-            <a:avLst/>
-          </a:prstGeom>
-          <a:solidFill>
-            <a:schemeClr val="lt1"/>
-          </a:solidFill>
-          <a:ln>
-            <a:noFill/>
-          </a:ln>
-        </p:spPr>
-        <p:txBody>
-          <a:bodyPr spcFirstLastPara="1" wrap="square" lIns="121900" tIns="121900" rIns="121900" bIns="121900" anchor="ctr" anchorCtr="0">
-            <a:noAutofit/>
-          </a:bodyPr>
-          <a:lstStyle/>
-          <a:p>
-            <a:endParaRPr sz="2400"/>
-          </a:p>
-        </p:txBody>
-      </p:sp>
-      <p:sp>
-        <p:nvSpPr>
-          <p:cNvPr id="8044" name="Google Shape;8044;p85"/>
-          <p:cNvSpPr/>
-          <p:nvPr/>
-        </p:nvSpPr>
-        <p:spPr>
-          <a:xfrm>
-            <a:off x="8670884" y="3003069"/>
-            <a:ext cx="475600" cy="593600"/>
-          </a:xfrm>
-          <a:prstGeom prst="rect">
-            <a:avLst/>
-          </a:prstGeom>
-          <a:solidFill>
-            <a:schemeClr val="lt1"/>
-          </a:solidFill>
-          <a:ln>
-            <a:noFill/>
-          </a:ln>
-        </p:spPr>
-        <p:txBody>
-          <a:bodyPr spcFirstLastPara="1" wrap="square" lIns="121900" tIns="121900" rIns="121900" bIns="121900" anchor="ctr" anchorCtr="0">
-            <a:noAutofit/>
-          </a:bodyPr>
-          <a:lstStyle/>
-          <a:p>
-            <a:endParaRPr sz="2400"/>
-          </a:p>
-        </p:txBody>
-      </p:sp>
-      <p:sp>
-        <p:nvSpPr>
           <p:cNvPr id="8052" name="Google Shape;8052;p85"/>
           <p:cNvSpPr/>
           <p:nvPr/>
         </p:nvSpPr>
         <p:spPr>
           <a:xfrm>
-            <a:off x="4140396" y="1218413"/>
+            <a:off x="4122357" y="1699677"/>
             <a:ext cx="1487200" cy="1460400"/>
           </a:xfrm>
           <a:prstGeom prst="rect">
@@ -5469,7 +5385,7 @@
         </p:blipFill>
         <p:spPr>
           <a:xfrm>
-            <a:off x="5093785" y="961516"/>
+            <a:off x="4301961" y="1745288"/>
             <a:ext cx="940379" cy="921633"/>
           </a:xfrm>
           <a:prstGeom prst="rect">
@@ -5489,7 +5405,7 @@
         </p:nvSpPr>
         <p:spPr>
           <a:xfrm>
-            <a:off x="3984229" y="2675547"/>
+            <a:off x="3966190" y="3156811"/>
             <a:ext cx="1487200" cy="1432000"/>
           </a:xfrm>
           <a:prstGeom prst="rect">
@@ -5528,7 +5444,7 @@
         </p:blipFill>
         <p:spPr>
           <a:xfrm>
-            <a:off x="5093785" y="2665841"/>
+            <a:off x="4301961" y="3160857"/>
             <a:ext cx="926263" cy="857757"/>
           </a:xfrm>
           <a:prstGeom prst="rect">
@@ -5542,14 +5458,72 @@
       </p:pic>
       <p:sp>
         <p:nvSpPr>
-          <p:cNvPr id="8058" name="Google Shape;8058;p85"/>
+          <p:cNvPr id="8063" name="Google Shape;8063;p85"/>
+          <p:cNvSpPr txBox="1"/>
+          <p:nvPr/>
+        </p:nvSpPr>
+        <p:spPr>
+          <a:xfrm>
+            <a:off x="6685602" y="1527402"/>
+            <a:ext cx="978822" cy="183542"/>
+          </a:xfrm>
+          <a:prstGeom prst="rect">
+            <a:avLst/>
+          </a:prstGeom>
+          <a:noFill/>
+          <a:ln>
+            <a:noFill/>
+          </a:ln>
+        </p:spPr>
+        <p:txBody>
+          <a:bodyPr spcFirstLastPara="1" wrap="square" lIns="121900" tIns="121900" rIns="121900" bIns="121900" anchor="t" anchorCtr="0">
+            <a:noAutofit/>
+          </a:bodyPr>
+          <a:lstStyle/>
+          <a:p>
+            <a:endParaRPr sz="2400"/>
+          </a:p>
+        </p:txBody>
+      </p:sp>
+      <p:sp>
+        <p:nvSpPr>
+          <p:cNvPr id="8064" name="Google Shape;8064;p85"/>
+          <p:cNvSpPr txBox="1"/>
+          <p:nvPr/>
+        </p:nvSpPr>
+        <p:spPr>
+          <a:xfrm>
+            <a:off x="6685585" y="1206202"/>
+            <a:ext cx="978822" cy="183542"/>
+          </a:xfrm>
+          <a:prstGeom prst="rect">
+            <a:avLst/>
+          </a:prstGeom>
+          <a:noFill/>
+          <a:ln>
+            <a:noFill/>
+          </a:ln>
+        </p:spPr>
+        <p:txBody>
+          <a:bodyPr spcFirstLastPara="1" wrap="square" lIns="121900" tIns="121900" rIns="121900" bIns="121900" anchor="t" anchorCtr="0">
+            <a:noAutofit/>
+          </a:bodyPr>
+          <a:lstStyle/>
+          <a:p>
+            <a:endParaRPr sz="2400"/>
+          </a:p>
+        </p:txBody>
+      </p:sp>
+      <p:sp>
+        <p:nvSpPr>
+          <p:cNvPr id="8065" name="Google Shape;8065;p85"/>
           <p:cNvSpPr/>
           <p:nvPr/>
         </p:nvSpPr>
         <p:spPr>
           <a:xfrm>
-            <a:off x="3968078" y="4068196"/>
-            <a:ext cx="1461600" cy="1416400"/>
+            <a:off x="6688251" y="1780467"/>
+            <a:ext cx="1053206" cy="2263819"/>
           </a:xfrm>
           <a:prstGeom prst="rect">
             <a:avLst/>
@@ -5573,102 +5547,13 @@
       </p:sp>
       <p:sp>
         <p:nvSpPr>
-          <p:cNvPr id="8063" name="Google Shape;8063;p85"/>
-          <p:cNvSpPr txBox="1"/>
-          <p:nvPr/>
-        </p:nvSpPr>
-        <p:spPr>
-          <a:xfrm>
-            <a:off x="7645541" y="1919287"/>
-            <a:ext cx="926400" cy="188000"/>
-          </a:xfrm>
-          <a:prstGeom prst="rect">
-            <a:avLst/>
-          </a:prstGeom>
-          <a:noFill/>
-          <a:ln>
-            <a:noFill/>
-          </a:ln>
-        </p:spPr>
-        <p:txBody>
-          <a:bodyPr spcFirstLastPara="1" wrap="square" lIns="121900" tIns="121900" rIns="121900" bIns="121900" anchor="t" anchorCtr="0">
-            <a:noAutofit/>
-          </a:bodyPr>
-          <a:lstStyle/>
-          <a:p>
-            <a:endParaRPr sz="2400"/>
-          </a:p>
-        </p:txBody>
-      </p:sp>
-      <p:sp>
-        <p:nvSpPr>
-          <p:cNvPr id="8064" name="Google Shape;8064;p85"/>
-          <p:cNvSpPr txBox="1"/>
-          <p:nvPr/>
-        </p:nvSpPr>
-        <p:spPr>
-          <a:xfrm>
-            <a:off x="7645524" y="1598087"/>
-            <a:ext cx="926400" cy="188000"/>
-          </a:xfrm>
-          <a:prstGeom prst="rect">
-            <a:avLst/>
-          </a:prstGeom>
-          <a:noFill/>
-          <a:ln>
-            <a:noFill/>
-          </a:ln>
-        </p:spPr>
-        <p:txBody>
-          <a:bodyPr spcFirstLastPara="1" wrap="square" lIns="121900" tIns="121900" rIns="121900" bIns="121900" anchor="t" anchorCtr="0">
-            <a:noAutofit/>
-          </a:bodyPr>
-          <a:lstStyle/>
-          <a:p>
-            <a:endParaRPr sz="2400"/>
-          </a:p>
-        </p:txBody>
-      </p:sp>
-      <p:sp>
-        <p:nvSpPr>
-          <p:cNvPr id="8065" name="Google Shape;8065;p85"/>
-          <p:cNvSpPr/>
-          <p:nvPr/>
-        </p:nvSpPr>
-        <p:spPr>
-          <a:xfrm>
-            <a:off x="7648190" y="2172352"/>
-            <a:ext cx="996800" cy="2318800"/>
-          </a:xfrm>
-          <a:prstGeom prst="rect">
-            <a:avLst/>
-          </a:prstGeom>
-          <a:solidFill>
-            <a:srgbClr val="FFFFFF"/>
-          </a:solidFill>
-          <a:ln>
-            <a:noFill/>
-          </a:ln>
-        </p:spPr>
-        <p:txBody>
-          <a:bodyPr spcFirstLastPara="1" wrap="square" lIns="121900" tIns="121900" rIns="121900" bIns="121900" anchor="ctr" anchorCtr="0">
-            <a:noAutofit/>
-          </a:bodyPr>
-          <a:lstStyle/>
-          <a:p>
-            <a:endParaRPr sz="2400"/>
-          </a:p>
-        </p:txBody>
-      </p:sp>
-      <p:sp>
-        <p:nvSpPr>
           <p:cNvPr id="8100" name="Google Shape;8100;p85"/>
           <p:cNvSpPr txBox="1"/>
           <p:nvPr/>
         </p:nvSpPr>
         <p:spPr>
           <a:xfrm>
-            <a:off x="1717689" y="5687577"/>
+            <a:off x="2432327" y="606813"/>
             <a:ext cx="2102400" cy="466800"/>
           </a:xfrm>
           <a:prstGeom prst="rect">
@@ -5689,7 +5574,7 @@
           <a:p>
             <a:pPr algn="ctr"/>
             <a:r>
-              <a:rPr lang="en" sz="1600" dirty="0" smtClean="0">
+              <a:rPr lang="en" sz="1600" dirty="0">
                 <a:latin typeface="Times New Roman"/>
                 <a:ea typeface="Times New Roman"/>
                 <a:cs typeface="Times New Roman"/>
@@ -5698,7 +5583,7 @@
               <a:t>HVI T</a:t>
             </a:r>
             <a:r>
-              <a:rPr lang="en-US" altLang="zh-CN" sz="1600" dirty="0" smtClean="0">
+              <a:rPr lang="en-US" altLang="zh-CN" sz="1600" dirty="0">
                 <a:latin typeface="Times New Roman"/>
                 <a:ea typeface="Times New Roman"/>
                 <a:cs typeface="Times New Roman"/>
@@ -5723,8 +5608,8 @@
         </p:nvSpPr>
         <p:spPr>
           <a:xfrm rot="5400000">
-            <a:off x="5449123" y="3214723"/>
-            <a:ext cx="2992432" cy="275100"/>
+            <a:off x="4659886" y="2734635"/>
+            <a:ext cx="2666592" cy="290667"/>
           </a:xfrm>
           <a:prstGeom prst="rect">
             <a:avLst/>
@@ -5758,12 +5643,12 @@
               <a:buNone/>
             </a:pPr>
             <a:r>
-              <a:rPr lang="en" sz="1200" b="1" dirty="0" smtClean="0">
+              <a:rPr lang="en" sz="1200" b="1" dirty="0">
                 <a:solidFill>
                   <a:srgbClr val="FF0000"/>
                 </a:solidFill>
               </a:rPr>
-              <a:t>LCA</a:t>
+              <a:t>CAB</a:t>
             </a:r>
             <a:endParaRPr sz="1200" b="1" dirty="0">
               <a:solidFill>
@@ -5781,8 +5666,8 @@
         </p:nvSpPr>
         <p:spPr>
           <a:xfrm rot="5400000">
-            <a:off x="6748316" y="3211948"/>
-            <a:ext cx="2216679" cy="359198"/>
+            <a:off x="5965813" y="2732916"/>
+            <a:ext cx="1814898" cy="379524"/>
           </a:xfrm>
           <a:prstGeom prst="rect">
             <a:avLst/>
@@ -5816,12 +5701,12 @@
               <a:buNone/>
             </a:pPr>
             <a:r>
-              <a:rPr lang="en" sz="1200" b="1" dirty="0" smtClean="0">
+              <a:rPr lang="en" sz="1200" b="1" dirty="0">
                 <a:solidFill>
                   <a:srgbClr val="FF0000"/>
                 </a:solidFill>
               </a:rPr>
-              <a:t>LCA</a:t>
+              <a:t>CAB</a:t>
             </a:r>
             <a:endParaRPr sz="1200" b="1" dirty="0">
               <a:solidFill>
@@ -5839,8 +5724,8 @@
         </p:nvSpPr>
         <p:spPr>
           <a:xfrm rot="5400000">
-            <a:off x="8183426" y="3183010"/>
-            <a:ext cx="1380120" cy="492230"/>
+            <a:off x="7244055" y="2718435"/>
+            <a:ext cx="1138238" cy="520084"/>
           </a:xfrm>
           <a:prstGeom prst="rect">
             <a:avLst/>
@@ -5874,12 +5759,12 @@
               <a:buNone/>
             </a:pPr>
             <a:r>
-              <a:rPr lang="en" sz="1200" b="1" dirty="0" smtClean="0">
+              <a:rPr lang="en" sz="1200" b="1" dirty="0">
                 <a:solidFill>
                   <a:srgbClr val="FF0000"/>
                 </a:solidFill>
               </a:rPr>
-              <a:t>LCA</a:t>
+              <a:t>CAB</a:t>
             </a:r>
             <a:endParaRPr sz="1200" b="1" dirty="0">
               <a:solidFill>
@@ -5897,8 +5782,8 @@
         </p:nvSpPr>
         <p:spPr>
           <a:xfrm>
-            <a:off x="7325278" y="3205780"/>
-            <a:ext cx="68000" cy="394800"/>
+            <a:off x="6365339" y="2813895"/>
+            <a:ext cx="71848" cy="385439"/>
           </a:xfrm>
           <a:prstGeom prst="rect">
             <a:avLst/>
@@ -5928,8 +5813,8 @@
         </p:nvSpPr>
         <p:spPr>
           <a:xfrm rot="5400000">
-            <a:off x="9155379" y="3291575"/>
-            <a:ext cx="2992432" cy="275100"/>
+            <a:off x="8130818" y="2811487"/>
+            <a:ext cx="2666592" cy="290667"/>
           </a:xfrm>
           <a:prstGeom prst="rect">
             <a:avLst/>
@@ -5963,12 +5848,12 @@
               <a:buNone/>
             </a:pPr>
             <a:r>
-              <a:rPr lang="en" sz="1200" b="1" dirty="0" smtClean="0">
+              <a:rPr lang="en" sz="1200" b="1" dirty="0">
                 <a:solidFill>
                   <a:srgbClr val="FF0000"/>
                 </a:solidFill>
               </a:rPr>
-              <a:t>LCA</a:t>
+              <a:t>CAB</a:t>
             </a:r>
             <a:endParaRPr sz="1200" b="1" dirty="0">
               <a:solidFill>
@@ -5986,8 +5871,8 @@
         </p:nvSpPr>
         <p:spPr>
           <a:xfrm rot="5400000">
-            <a:off x="8693903" y="3238954"/>
-            <a:ext cx="2216679" cy="359198"/>
+            <a:off x="7810547" y="2766645"/>
+            <a:ext cx="1814898" cy="379524"/>
           </a:xfrm>
           <a:prstGeom prst="rect">
             <a:avLst/>
@@ -6021,12 +5906,12 @@
               <a:buNone/>
             </a:pPr>
             <a:r>
-              <a:rPr lang="en" sz="1200" b="1" dirty="0" smtClean="0">
+              <a:rPr lang="en" sz="1200" b="1" dirty="0">
                 <a:solidFill>
                   <a:srgbClr val="FF0000"/>
                 </a:solidFill>
               </a:rPr>
-              <a:t>LCA</a:t>
+              <a:t>CAB</a:t>
             </a:r>
             <a:endParaRPr sz="1200" b="1" dirty="0">
               <a:solidFill>
@@ -6038,47 +5923,25 @@
       </p:sp>
       <p:sp>
         <p:nvSpPr>
-          <p:cNvPr id="152" name="Google Shape;116;p19"/>
-          <p:cNvSpPr/>
-          <p:nvPr/>
-        </p:nvSpPr>
-        <p:spPr>
-          <a:xfrm>
-            <a:off x="4071893" y="1012556"/>
-            <a:ext cx="352464" cy="954086"/>
-          </a:xfrm>
-          <a:prstGeom prst="cube">
-            <a:avLst>
-              <a:gd name="adj" fmla="val 68741"/>
-            </a:avLst>
-          </a:prstGeom>
-          <a:gradFill>
-            <a:gsLst>
-              <a:gs pos="0">
-                <a:srgbClr val="E0EDBA">
-                  <a:alpha val="79215"/>
-                </a:srgbClr>
-              </a:gs>
-              <a:gs pos="100000">
-                <a:srgbClr val="DE87F1">
-                  <a:alpha val="48235"/>
-                </a:srgbClr>
-              </a:gs>
-            </a:gsLst>
-            <a:lin ang="13500032" scaled="0"/>
-          </a:gradFill>
-          <a:ln w="9525" cap="flat" cmpd="sng">
-            <a:solidFill>
-              <a:schemeClr val="dk2"/>
-            </a:solidFill>
-            <a:prstDash val="solid"/>
-            <a:round/>
-            <a:headEnd type="none" w="sm" len="sm"/>
-            <a:tailEnd type="none" w="sm" len="sm"/>
+          <p:cNvPr id="160" name="Google Shape;8410;p96"/>
+          <p:cNvSpPr txBox="1"/>
+          <p:nvPr/>
+        </p:nvSpPr>
+        <p:spPr>
+          <a:xfrm>
+            <a:off x="396861" y="2846321"/>
+            <a:ext cx="929666" cy="229951"/>
+          </a:xfrm>
+          <a:prstGeom prst="rect">
+            <a:avLst/>
+          </a:prstGeom>
+          <a:noFill/>
+          <a:ln>
+            <a:noFill/>
           </a:ln>
         </p:spPr>
         <p:txBody>
-          <a:bodyPr spcFirstLastPara="1" wrap="square" lIns="91425" tIns="91425" rIns="91425" bIns="91425" anchor="ctr" anchorCtr="0">
+          <a:bodyPr spcFirstLastPara="1" wrap="square" lIns="91425" tIns="91425" rIns="91425" bIns="91425" anchor="t" anchorCtr="0">
             <a:noAutofit/>
           </a:bodyPr>
           <a:lstStyle/>
@@ -6092,53 +5955,35 @@
               </a:spcAft>
               <a:buNone/>
             </a:pPr>
-            <a:endParaRPr/>
-          </a:p>
-        </p:txBody>
-      </p:sp>
-      <p:sp>
-        <p:nvSpPr>
-          <p:cNvPr id="153" name="Google Shape;116;p19"/>
-          <p:cNvSpPr/>
-          <p:nvPr/>
-        </p:nvSpPr>
-        <p:spPr>
-          <a:xfrm>
-            <a:off x="4059179" y="2641071"/>
-            <a:ext cx="352464" cy="954086"/>
-          </a:xfrm>
-          <a:prstGeom prst="cube">
-            <a:avLst>
-              <a:gd name="adj" fmla="val 68741"/>
-            </a:avLst>
-          </a:prstGeom>
-          <a:gradFill>
-            <a:gsLst>
-              <a:gs pos="0">
-                <a:srgbClr val="E0EDBA">
-                  <a:alpha val="79215"/>
-                </a:srgbClr>
-              </a:gs>
-              <a:gs pos="100000">
-                <a:srgbClr val="DE87F1">
-                  <a:alpha val="48235"/>
-                </a:srgbClr>
-              </a:gs>
-            </a:gsLst>
-            <a:lin ang="13500032" scaled="0"/>
-          </a:gradFill>
-          <a:ln w="9525" cap="flat" cmpd="sng">
-            <a:solidFill>
-              <a:schemeClr val="dk2"/>
-            </a:solidFill>
-            <a:prstDash val="solid"/>
-            <a:round/>
-            <a:headEnd type="none" w="sm" len="sm"/>
-            <a:tailEnd type="none" w="sm" len="sm"/>
+            <a:r>
+              <a:rPr lang="en" sz="1000" b="1" dirty="0"/>
+              <a:t>Input visible</a:t>
+            </a:r>
+            <a:endParaRPr sz="1000" b="1" dirty="0"/>
+          </a:p>
+        </p:txBody>
+      </p:sp>
+      <p:sp>
+        <p:nvSpPr>
+          <p:cNvPr id="161" name="Google Shape;8410;p96"/>
+          <p:cNvSpPr txBox="1"/>
+          <p:nvPr/>
+        </p:nvSpPr>
+        <p:spPr>
+          <a:xfrm>
+            <a:off x="362485" y="4763235"/>
+            <a:ext cx="1057053" cy="265823"/>
+          </a:xfrm>
+          <a:prstGeom prst="rect">
+            <a:avLst/>
+          </a:prstGeom>
+          <a:noFill/>
+          <a:ln>
+            <a:noFill/>
           </a:ln>
         </p:spPr>
         <p:txBody>
-          <a:bodyPr spcFirstLastPara="1" wrap="square" lIns="91425" tIns="91425" rIns="91425" bIns="91425" anchor="ctr" anchorCtr="0">
+          <a:bodyPr spcFirstLastPara="1" wrap="square" lIns="91425" tIns="91425" rIns="91425" bIns="91425" anchor="t" anchorCtr="0">
             <a:noAutofit/>
           </a:bodyPr>
           <a:lstStyle/>
@@ -6152,88 +5997,28 @@
               </a:spcAft>
               <a:buNone/>
             </a:pPr>
-            <a:endParaRPr/>
-          </a:p>
-        </p:txBody>
-      </p:sp>
-      <p:sp>
-        <p:nvSpPr>
-          <p:cNvPr id="154" name="Google Shape;116;p19"/>
-          <p:cNvSpPr/>
-          <p:nvPr/>
-        </p:nvSpPr>
-        <p:spPr>
-          <a:xfrm>
-            <a:off x="4021484" y="4384780"/>
-            <a:ext cx="352464" cy="954086"/>
-          </a:xfrm>
-          <a:prstGeom prst="cube">
-            <a:avLst>
-              <a:gd name="adj" fmla="val 68741"/>
-            </a:avLst>
-          </a:prstGeom>
-          <a:gradFill>
-            <a:gsLst>
-              <a:gs pos="0">
-                <a:srgbClr val="E0EDBA">
-                  <a:alpha val="79215"/>
-                </a:srgbClr>
-              </a:gs>
-              <a:gs pos="100000">
-                <a:srgbClr val="DE87F1">
-                  <a:alpha val="48235"/>
-                </a:srgbClr>
-              </a:gs>
-            </a:gsLst>
-            <a:lin ang="13500032" scaled="0"/>
-          </a:gradFill>
-          <a:ln w="9525" cap="flat" cmpd="sng">
-            <a:solidFill>
-              <a:schemeClr val="dk2"/>
-            </a:solidFill>
-            <a:prstDash val="solid"/>
-            <a:round/>
-            <a:headEnd type="none" w="sm" len="sm"/>
-            <a:tailEnd type="none" w="sm" len="sm"/>
-          </a:ln>
-        </p:spPr>
-        <p:txBody>
-          <a:bodyPr spcFirstLastPara="1" wrap="square" lIns="91425" tIns="91425" rIns="91425" bIns="91425" anchor="ctr" anchorCtr="0">
-            <a:noAutofit/>
-          </a:bodyPr>
-          <a:lstStyle/>
-          <a:p>
-            <a:pPr marL="0" lvl="0" indent="0" algn="l" rtl="0">
-              <a:spcBef>
-                <a:spcPts val="0"/>
-              </a:spcBef>
-              <a:spcAft>
-                <a:spcPts val="0"/>
-              </a:spcAft>
-              <a:buNone/>
-            </a:pPr>
-            <a:endParaRPr/>
-          </a:p>
-        </p:txBody>
-      </p:sp>
-      <p:pic>
-        <p:nvPicPr>
-          <p:cNvPr id="155" name="Google Shape;8057;p85"/>
-          <p:cNvPicPr preferRelativeResize="0"/>
-          <p:nvPr/>
-        </p:nvPicPr>
-        <p:blipFill>
-          <a:blip r:embed="rId4">
-            <a:alphaModFix/>
-          </a:blip>
-          <a:stretch>
-            <a:fillRect/>
-          </a:stretch>
-        </p:blipFill>
-        <p:spPr>
-          <a:xfrm>
-            <a:off x="5087741" y="4353962"/>
-            <a:ext cx="926263" cy="857757"/>
+            <a:r>
+              <a:rPr lang="en" sz="1000" b="1" dirty="0"/>
+              <a:t>Input I</a:t>
+            </a:r>
+            <a:r>
+              <a:rPr lang="en-US" altLang="zh-CN" sz="1000" b="1" dirty="0" err="1"/>
+              <a:t>nfrared</a:t>
+            </a:r>
+            <a:endParaRPr sz="1000" b="1" dirty="0"/>
+          </a:p>
+        </p:txBody>
+      </p:sp>
+      <p:sp>
+        <p:nvSpPr>
+          <p:cNvPr id="162" name="Google Shape;8410;p96"/>
+          <p:cNvSpPr txBox="1"/>
+          <p:nvPr/>
+        </p:nvSpPr>
+        <p:spPr>
+          <a:xfrm>
+            <a:off x="458740" y="1150163"/>
+            <a:ext cx="668409" cy="272565"/>
           </a:xfrm>
           <a:prstGeom prst="rect">
             <a:avLst/>
@@ -6243,130 +6028,66 @@
             <a:noFill/>
           </a:ln>
         </p:spPr>
-      </p:pic>
-      <p:sp>
-        <p:nvSpPr>
-          <p:cNvPr id="156" name="Google Shape;116;p19"/>
-          <p:cNvSpPr/>
-          <p:nvPr/>
-        </p:nvSpPr>
-        <p:spPr>
-          <a:xfrm>
-            <a:off x="11467411" y="1850596"/>
-            <a:ext cx="352464" cy="954086"/>
-          </a:xfrm>
-          <a:prstGeom prst="cube">
-            <a:avLst>
-              <a:gd name="adj" fmla="val 68741"/>
-            </a:avLst>
-          </a:prstGeom>
-          <a:gradFill>
-            <a:gsLst>
-              <a:gs pos="0">
-                <a:srgbClr val="E0EDBA">
-                  <a:alpha val="79215"/>
-                </a:srgbClr>
-              </a:gs>
-              <a:gs pos="100000">
-                <a:srgbClr val="DE87F1">
-                  <a:alpha val="48235"/>
-                </a:srgbClr>
-              </a:gs>
-            </a:gsLst>
-            <a:lin ang="13500032" scaled="0"/>
-          </a:gradFill>
-          <a:ln w="9525" cap="flat" cmpd="sng">
-            <a:solidFill>
-              <a:schemeClr val="dk2"/>
-            </a:solidFill>
-            <a:prstDash val="solid"/>
-            <a:round/>
-            <a:headEnd type="none" w="sm" len="sm"/>
-            <a:tailEnd type="none" w="sm" len="sm"/>
-          </a:ln>
-        </p:spPr>
-        <p:txBody>
-          <a:bodyPr spcFirstLastPara="1" wrap="square" lIns="91425" tIns="91425" rIns="91425" bIns="91425" anchor="ctr" anchorCtr="0">
+        <p:txBody>
+          <a:bodyPr spcFirstLastPara="1" wrap="square" lIns="91425" tIns="91425" rIns="91425" bIns="91425" anchor="t" anchorCtr="0">
             <a:noAutofit/>
           </a:bodyPr>
           <a:lstStyle/>
           <a:p>
-            <a:pPr marL="0" lvl="0" indent="0" algn="l" rtl="0">
-              <a:spcBef>
-                <a:spcPts val="0"/>
-              </a:spcBef>
-              <a:spcAft>
-                <a:spcPts val="0"/>
-              </a:spcAft>
-              <a:buNone/>
-            </a:pPr>
-            <a:endParaRPr/>
-          </a:p>
-        </p:txBody>
-      </p:sp>
-      <p:sp>
-        <p:nvSpPr>
-          <p:cNvPr id="157" name="Google Shape;116;p19"/>
-          <p:cNvSpPr/>
-          <p:nvPr/>
-        </p:nvSpPr>
-        <p:spPr>
-          <a:xfrm>
-            <a:off x="11467411" y="3991736"/>
-            <a:ext cx="352464" cy="954086"/>
-          </a:xfrm>
-          <a:prstGeom prst="cube">
-            <a:avLst>
-              <a:gd name="adj" fmla="val 68741"/>
-            </a:avLst>
-          </a:prstGeom>
-          <a:gradFill>
-            <a:gsLst>
-              <a:gs pos="0">
-                <a:srgbClr val="E0EDBA">
-                  <a:alpha val="79215"/>
-                </a:srgbClr>
-              </a:gs>
-              <a:gs pos="100000">
-                <a:srgbClr val="DE87F1">
-                  <a:alpha val="48235"/>
-                </a:srgbClr>
-              </a:gs>
-            </a:gsLst>
-            <a:lin ang="13500032" scaled="0"/>
-          </a:gradFill>
-          <a:ln w="9525" cap="flat" cmpd="sng">
-            <a:solidFill>
-              <a:schemeClr val="dk2"/>
-            </a:solidFill>
-            <a:prstDash val="solid"/>
-            <a:round/>
-            <a:headEnd type="none" w="sm" len="sm"/>
-            <a:tailEnd type="none" w="sm" len="sm"/>
+            <a:pPr lvl="0"/>
+            <a:r>
+              <a:rPr lang="en" sz="1000" b="1" dirty="0"/>
+              <a:t>H</a:t>
+            </a:r>
+            <a:r>
+              <a:rPr lang="en-US" altLang="zh-CN" sz="1000" b="1" dirty="0"/>
+              <a:t>×W×3</a:t>
+            </a:r>
+            <a:endParaRPr sz="1000" b="1" dirty="0"/>
+          </a:p>
+        </p:txBody>
+      </p:sp>
+      <p:sp>
+        <p:nvSpPr>
+          <p:cNvPr id="163" name="Google Shape;8410;p96"/>
+          <p:cNvSpPr txBox="1"/>
+          <p:nvPr/>
+        </p:nvSpPr>
+        <p:spPr>
+          <a:xfrm>
+            <a:off x="520616" y="3236327"/>
+            <a:ext cx="661534" cy="272565"/>
+          </a:xfrm>
+          <a:prstGeom prst="rect">
+            <a:avLst/>
+          </a:prstGeom>
+          <a:noFill/>
+          <a:ln>
+            <a:noFill/>
           </a:ln>
         </p:spPr>
         <p:txBody>
-          <a:bodyPr spcFirstLastPara="1" wrap="square" lIns="91425" tIns="91425" rIns="91425" bIns="91425" anchor="ctr" anchorCtr="0">
+          <a:bodyPr spcFirstLastPara="1" wrap="square" lIns="91425" tIns="91425" rIns="91425" bIns="91425" anchor="t" anchorCtr="0">
             <a:noAutofit/>
           </a:bodyPr>
           <a:lstStyle/>
           <a:p>
-            <a:pPr marL="0" lvl="0" indent="0" algn="l" rtl="0">
-              <a:spcBef>
-                <a:spcPts val="0"/>
-              </a:spcBef>
-              <a:spcAft>
-                <a:spcPts val="0"/>
-              </a:spcAft>
-              <a:buNone/>
-            </a:pPr>
-            <a:endParaRPr/>
+            <a:pPr lvl="0"/>
+            <a:r>
+              <a:rPr lang="en" sz="1000" b="1" dirty="0"/>
+              <a:t>H</a:t>
+            </a:r>
+            <a:r>
+              <a:rPr lang="en-US" altLang="zh-CN" sz="1000" b="1" dirty="0"/>
+              <a:t>×W×1</a:t>
+            </a:r>
+            <a:endParaRPr sz="1000" b="1" dirty="0"/>
           </a:p>
         </p:txBody>
       </p:sp>
       <p:pic>
         <p:nvPicPr>
-          <p:cNvPr id="2" name="图片 1"/>
+          <p:cNvPr id="4" name="图片 3"/>
           <p:cNvPicPr>
             <a:picLocks noChangeAspect="1"/>
           </p:cNvPicPr>
@@ -6380,8 +6101,8 @@
         </p:blipFill>
         <p:spPr>
           <a:xfrm>
-            <a:off x="289108" y="4409322"/>
-            <a:ext cx="1428949" cy="905001"/>
+            <a:off x="2196484" y="2578656"/>
+            <a:ext cx="780090" cy="510661"/>
           </a:xfrm>
           <a:prstGeom prst="rect">
             <a:avLst/>
@@ -6390,7 +6111,7 @@
       </p:pic>
       <p:pic>
         <p:nvPicPr>
-          <p:cNvPr id="3" name="图片 2"/>
+          <p:cNvPr id="5" name="图片 4"/>
           <p:cNvPicPr>
             <a:picLocks noChangeAspect="1"/>
           </p:cNvPicPr>
@@ -6404,8 +6125,8 @@
         </p:blipFill>
         <p:spPr>
           <a:xfrm>
-            <a:off x="276681" y="1866445"/>
-            <a:ext cx="1457528" cy="1000265"/>
+            <a:off x="2196485" y="1438330"/>
+            <a:ext cx="789620" cy="526413"/>
           </a:xfrm>
           <a:prstGeom prst="rect">
             <a:avLst/>
@@ -6414,14 +6135,14 @@
       </p:pic>
       <p:sp>
         <p:nvSpPr>
-          <p:cNvPr id="160" name="Google Shape;8410;p96"/>
+          <p:cNvPr id="167" name="Google Shape;8410;p96"/>
           <p:cNvSpPr txBox="1"/>
           <p:nvPr/>
         </p:nvSpPr>
         <p:spPr>
           <a:xfrm>
-            <a:off x="640785" y="2838089"/>
-            <a:ext cx="1004184" cy="272565"/>
+            <a:off x="2016484" y="2009955"/>
+            <a:ext cx="1443889" cy="272565"/>
           </a:xfrm>
           <a:prstGeom prst="rect">
             <a:avLst/>
@@ -6437,18 +6158,13 @@
           </a:bodyPr>
           <a:lstStyle/>
           <a:p>
-            <a:pPr marL="0" lvl="0" indent="0" algn="l" rtl="0">
-              <a:spcBef>
-                <a:spcPts val="0"/>
-              </a:spcBef>
-              <a:spcAft>
-                <a:spcPts val="0"/>
-              </a:spcAft>
-              <a:buNone/>
-            </a:pPr>
-            <a:r>
-              <a:rPr lang="en" sz="1000" b="1" dirty="0" smtClean="0"/>
-              <a:t>Input visible</a:t>
+            <a:r>
+              <a:rPr lang="en-US" altLang="zh-CN" sz="1000" b="1" dirty="0"/>
+              <a:t>Visible </a:t>
+            </a:r>
+            <a:r>
+              <a:rPr lang="en" sz="1000" b="1" dirty="0"/>
+              <a:t>HV Color Map</a:t>
             </a:r>
             <a:endParaRPr sz="1000" b="1" dirty="0"/>
           </a:p>
@@ -6456,14 +6172,14 @@
       </p:sp>
       <p:sp>
         <p:nvSpPr>
-          <p:cNvPr id="161" name="Google Shape;8410;p96"/>
+          <p:cNvPr id="170" name="Google Shape;8410;p96"/>
           <p:cNvSpPr txBox="1"/>
           <p:nvPr/>
         </p:nvSpPr>
         <p:spPr>
           <a:xfrm>
-            <a:off x="564805" y="5251377"/>
-            <a:ext cx="1057053" cy="265823"/>
+            <a:off x="2016484" y="3124981"/>
+            <a:ext cx="1443889" cy="272565"/>
           </a:xfrm>
           <a:prstGeom prst="rect">
             <a:avLst/>
@@ -6479,98 +6195,13 @@
           </a:bodyPr>
           <a:lstStyle/>
           <a:p>
-            <a:pPr marL="0" lvl="0" indent="0" algn="l" rtl="0">
-              <a:spcBef>
-                <a:spcPts val="0"/>
-              </a:spcBef>
-              <a:spcAft>
-                <a:spcPts val="0"/>
-              </a:spcAft>
-              <a:buNone/>
-            </a:pPr>
-            <a:r>
-              <a:rPr lang="en" sz="1000" b="1" dirty="0" smtClean="0"/>
-              <a:t>Input I</a:t>
-            </a:r>
-            <a:r>
-              <a:rPr lang="en-US" altLang="zh-CN" sz="1000" b="1" dirty="0" err="1" smtClean="0"/>
-              <a:t>nfrared</a:t>
-            </a:r>
-            <a:endParaRPr sz="1000" b="1" dirty="0"/>
-          </a:p>
-        </p:txBody>
-      </p:sp>
-      <p:sp>
-        <p:nvSpPr>
-          <p:cNvPr id="162" name="Google Shape;8410;p96"/>
-          <p:cNvSpPr txBox="1"/>
-          <p:nvPr/>
-        </p:nvSpPr>
-        <p:spPr>
-          <a:xfrm>
-            <a:off x="617674" y="1555804"/>
-            <a:ext cx="1004184" cy="272565"/>
-          </a:xfrm>
-          <a:prstGeom prst="rect">
-            <a:avLst/>
-          </a:prstGeom>
-          <a:noFill/>
-          <a:ln>
-            <a:noFill/>
-          </a:ln>
-        </p:spPr>
-        <p:txBody>
-          <a:bodyPr spcFirstLastPara="1" wrap="square" lIns="91425" tIns="91425" rIns="91425" bIns="91425" anchor="t" anchorCtr="0">
-            <a:noAutofit/>
-          </a:bodyPr>
-          <a:lstStyle/>
-          <a:p>
-            <a:pPr lvl="0"/>
-            <a:r>
-              <a:rPr lang="en" sz="1000" b="1" dirty="0" smtClean="0"/>
-              <a:t>H</a:t>
-            </a:r>
-            <a:r>
-              <a:rPr lang="en-US" altLang="zh-CN" sz="1000" b="1" dirty="0" smtClean="0"/>
-              <a:t>×W×3</a:t>
-            </a:r>
-            <a:endParaRPr sz="1000" b="1" dirty="0"/>
-          </a:p>
-        </p:txBody>
-      </p:sp>
-      <p:sp>
-        <p:nvSpPr>
-          <p:cNvPr id="163" name="Google Shape;8410;p96"/>
-          <p:cNvSpPr txBox="1"/>
-          <p:nvPr/>
-        </p:nvSpPr>
-        <p:spPr>
-          <a:xfrm>
-            <a:off x="725985" y="4088853"/>
-            <a:ext cx="1004184" cy="272565"/>
-          </a:xfrm>
-          <a:prstGeom prst="rect">
-            <a:avLst/>
-          </a:prstGeom>
-          <a:noFill/>
-          <a:ln>
-            <a:noFill/>
-          </a:ln>
-        </p:spPr>
-        <p:txBody>
-          <a:bodyPr spcFirstLastPara="1" wrap="square" lIns="91425" tIns="91425" rIns="91425" bIns="91425" anchor="t" anchorCtr="0">
-            <a:noAutofit/>
-          </a:bodyPr>
-          <a:lstStyle/>
-          <a:p>
-            <a:pPr lvl="0"/>
-            <a:r>
-              <a:rPr lang="en" sz="1000" b="1" dirty="0" smtClean="0"/>
-              <a:t>H</a:t>
-            </a:r>
-            <a:r>
-              <a:rPr lang="en-US" altLang="zh-CN" sz="1000" b="1" dirty="0" smtClean="0"/>
-              <a:t>×W×1</a:t>
+            <a:r>
+              <a:rPr lang="en-US" altLang="zh-CN" sz="1000" b="1" dirty="0"/>
+              <a:t>Visible </a:t>
+            </a:r>
+            <a:r>
+              <a:rPr lang="en" sz="1000" b="1" dirty="0"/>
+              <a:t>Itensity Map</a:t>
             </a:r>
             <a:endParaRPr sz="1000" b="1" dirty="0"/>
           </a:p>
@@ -6578,7 +6209,7 @@
       </p:sp>
       <p:pic>
         <p:nvPicPr>
-          <p:cNvPr id="4" name="图片 3"/>
+          <p:cNvPr id="171" name="图片 170"/>
           <p:cNvPicPr>
             <a:picLocks noChangeAspect="1"/>
           </p:cNvPicPr>
@@ -6592,48 +6223,207 @@
         </p:blipFill>
         <p:spPr>
           <a:xfrm>
-            <a:off x="2274219" y="2778492"/>
-            <a:ext cx="1037616" cy="679243"/>
+            <a:off x="2196484" y="3983148"/>
+            <a:ext cx="1089879" cy="690257"/>
           </a:xfrm>
           <a:prstGeom prst="rect">
             <a:avLst/>
           </a:prstGeom>
         </p:spPr>
       </p:pic>
+      <p:sp>
+        <p:nvSpPr>
+          <p:cNvPr id="172" name="Google Shape;8410;p96"/>
+          <p:cNvSpPr txBox="1"/>
+          <p:nvPr/>
+        </p:nvSpPr>
+        <p:spPr>
+          <a:xfrm>
+            <a:off x="2016484" y="4703748"/>
+            <a:ext cx="1443889" cy="272565"/>
+          </a:xfrm>
+          <a:prstGeom prst="rect">
+            <a:avLst/>
+          </a:prstGeom>
+          <a:noFill/>
+          <a:ln>
+            <a:noFill/>
+          </a:ln>
+        </p:spPr>
+        <p:txBody>
+          <a:bodyPr spcFirstLastPara="1" wrap="square" lIns="91425" tIns="91425" rIns="91425" bIns="91425" anchor="t" anchorCtr="0">
+            <a:noAutofit/>
+          </a:bodyPr>
+          <a:lstStyle/>
+          <a:p>
+            <a:r>
+              <a:rPr lang="en-US" altLang="zh-CN" sz="1000" b="1" dirty="0"/>
+              <a:t>Infrared </a:t>
+            </a:r>
+            <a:r>
+              <a:rPr lang="en" sz="1000" b="1" dirty="0"/>
+              <a:t>Itensity Map</a:t>
+            </a:r>
+            <a:endParaRPr sz="1000" b="1" dirty="0"/>
+          </a:p>
+        </p:txBody>
+      </p:sp>
+      <p:cxnSp>
+        <p:nvCxnSpPr>
+          <p:cNvPr id="50" name="Google Shape;10001;p124">
+            <a:extLst>
+              <a:ext uri="{FF2B5EF4-FFF2-40B4-BE49-F238E27FC236}">
+                <a16:creationId xmlns:a16="http://schemas.microsoft.com/office/drawing/2014/main" id="{149AD7E0-B9EE-48D3-AD61-2B30083F455F}"/>
+              </a:ext>
+            </a:extLst>
+          </p:cNvPr>
+          <p:cNvCxnSpPr/>
+          <p:nvPr/>
+        </p:nvCxnSpPr>
+        <p:spPr>
+          <a:xfrm>
+            <a:off x="1548592" y="1721927"/>
+            <a:ext cx="533269" cy="0"/>
+          </a:xfrm>
+          <a:prstGeom prst="straightConnector1">
+            <a:avLst/>
+          </a:prstGeom>
+          <a:noFill/>
+          <a:ln w="19050" cap="flat" cmpd="sng">
+            <a:solidFill>
+              <a:srgbClr val="000000"/>
+            </a:solidFill>
+            <a:prstDash val="solid"/>
+            <a:round/>
+            <a:headEnd type="none" w="med" len="med"/>
+            <a:tailEnd type="triangle" w="med" len="med"/>
+          </a:ln>
+        </p:spPr>
+      </p:cxnSp>
       <p:pic>
         <p:nvPicPr>
-          <p:cNvPr id="5" name="图片 4"/>
+          <p:cNvPr id="7" name="图片 6">
+            <a:extLst>
+              <a:ext uri="{FF2B5EF4-FFF2-40B4-BE49-F238E27FC236}">
+                <a16:creationId xmlns:a16="http://schemas.microsoft.com/office/drawing/2014/main" id="{0ABB3683-A035-4D03-B935-77CDB2EDBEEC}"/>
+              </a:ext>
+            </a:extLst>
+          </p:cNvPr>
           <p:cNvPicPr>
             <a:picLocks noChangeAspect="1"/>
           </p:cNvPicPr>
           <p:nvPr/>
         </p:nvPicPr>
         <p:blipFill>
-          <a:blip r:embed="rId8"/>
+          <a:blip r:embed="rId8" cstate="print">
+            <a:extLst>
+              <a:ext uri="{28A0092B-C50C-407E-A947-70E740481C1C}">
+                <a14:useLocalDpi xmlns:a14="http://schemas.microsoft.com/office/drawing/2010/main" val="0"/>
+              </a:ext>
+            </a:extLst>
+          </a:blip>
           <a:stretch>
             <a:fillRect/>
           </a:stretch>
         </p:blipFill>
         <p:spPr>
           <a:xfrm>
-            <a:off x="2291286" y="1293951"/>
-            <a:ext cx="1009037" cy="672691"/>
+            <a:off x="10244737" y="2658979"/>
+            <a:ext cx="943103" cy="799240"/>
           </a:xfrm>
           <a:prstGeom prst="rect">
             <a:avLst/>
           </a:prstGeom>
         </p:spPr>
       </p:pic>
-      <p:sp>
-        <p:nvSpPr>
-          <p:cNvPr id="167" name="Google Shape;8410;p96"/>
+      <p:pic>
+        <p:nvPicPr>
+          <p:cNvPr id="9" name="图片 8">
+            <a:extLst>
+              <a:ext uri="{FF2B5EF4-FFF2-40B4-BE49-F238E27FC236}">
+                <a16:creationId xmlns:a16="http://schemas.microsoft.com/office/drawing/2014/main" id="{9DFE6C22-A48C-480A-A5FC-A8236376B9BC}"/>
+              </a:ext>
+            </a:extLst>
+          </p:cNvPr>
+          <p:cNvPicPr>
+            <a:picLocks noChangeAspect="1"/>
+          </p:cNvPicPr>
+          <p:nvPr/>
+        </p:nvPicPr>
+        <p:blipFill>
+          <a:blip r:embed="rId9" cstate="print">
+            <a:extLst>
+              <a:ext uri="{28A0092B-C50C-407E-A947-70E740481C1C}">
+                <a14:useLocalDpi xmlns:a14="http://schemas.microsoft.com/office/drawing/2010/main" val="0"/>
+              </a:ext>
+            </a:extLst>
+          </a:blip>
+          <a:stretch>
+            <a:fillRect/>
+          </a:stretch>
+        </p:blipFill>
+        <p:spPr>
+          <a:xfrm>
+            <a:off x="0" y="1629420"/>
+            <a:ext cx="1525181" cy="1292527"/>
+          </a:xfrm>
+          <a:prstGeom prst="rect">
+            <a:avLst/>
+          </a:prstGeom>
+        </p:spPr>
+      </p:pic>
+      <p:pic>
+        <p:nvPicPr>
+          <p:cNvPr id="11" name="图片 10">
+            <a:extLst>
+              <a:ext uri="{FF2B5EF4-FFF2-40B4-BE49-F238E27FC236}">
+                <a16:creationId xmlns:a16="http://schemas.microsoft.com/office/drawing/2014/main" id="{C8ACD14F-7E59-4476-8DBA-94B6B36AC6E7}"/>
+              </a:ext>
+            </a:extLst>
+          </p:cNvPr>
+          <p:cNvPicPr>
+            <a:picLocks noChangeAspect="1"/>
+          </p:cNvPicPr>
+          <p:nvPr/>
+        </p:nvPicPr>
+        <p:blipFill>
+          <a:blip r:embed="rId10" cstate="print">
+            <a:extLst>
+              <a:ext uri="{28A0092B-C50C-407E-A947-70E740481C1C}">
+                <a14:useLocalDpi xmlns:a14="http://schemas.microsoft.com/office/drawing/2010/main" val="0"/>
+              </a:ext>
+            </a:extLst>
+          </a:blip>
+          <a:stretch>
+            <a:fillRect/>
+          </a:stretch>
+        </p:blipFill>
+        <p:spPr>
+          <a:xfrm>
+            <a:off x="13750" y="3513225"/>
+            <a:ext cx="1525181" cy="1292527"/>
+          </a:xfrm>
+          <a:prstGeom prst="rect">
+            <a:avLst/>
+          </a:prstGeom>
+        </p:spPr>
+      </p:pic>
+      <p:sp>
+        <p:nvSpPr>
+          <p:cNvPr id="57" name="Google Shape;8410;p96">
+            <a:extLst>
+              <a:ext uri="{FF2B5EF4-FFF2-40B4-BE49-F238E27FC236}">
+                <a16:creationId xmlns:a16="http://schemas.microsoft.com/office/drawing/2014/main" id="{81EF4A03-8F24-42CB-A358-947A0D35C3D4}"/>
+              </a:ext>
+            </a:extLst>
+          </p:cNvPr>
           <p:cNvSpPr txBox="1"/>
           <p:nvPr/>
         </p:nvSpPr>
         <p:spPr>
           <a:xfrm>
-            <a:off x="2100775" y="1927453"/>
-            <a:ext cx="1443889" cy="272565"/>
+            <a:off x="4365038" y="2622994"/>
+            <a:ext cx="883318" cy="272565"/>
           </a:xfrm>
           <a:prstGeom prst="rect">
             <a:avLst/>
@@ -6650,27 +6440,31 @@
           <a:lstStyle/>
           <a:p>
             <a:r>
-              <a:rPr lang="en-US" altLang="zh-CN" sz="1000" b="1" dirty="0" smtClean="0"/>
-              <a:t>Visible </a:t>
-            </a:r>
-            <a:r>
-              <a:rPr lang="en" sz="1000" b="1" dirty="0" smtClean="0"/>
-              <a:t>HV Color Map</a:t>
-            </a:r>
+              <a:rPr lang="en-US" altLang="zh-CN" sz="1000" b="1" dirty="0"/>
+              <a:t>HV Feature</a:t>
+            </a:r>
+          </a:p>
+          <a:p>
             <a:endParaRPr sz="1000" b="1" dirty="0"/>
           </a:p>
         </p:txBody>
       </p:sp>
       <p:sp>
         <p:nvSpPr>
-          <p:cNvPr id="168" name="Google Shape;8410;p96"/>
+          <p:cNvPr id="58" name="Google Shape;8410;p96">
+            <a:extLst>
+              <a:ext uri="{FF2B5EF4-FFF2-40B4-BE49-F238E27FC236}">
+                <a16:creationId xmlns:a16="http://schemas.microsoft.com/office/drawing/2014/main" id="{C598BC07-344D-43EB-91B0-9C2BFE9ADAD9}"/>
+              </a:ext>
+            </a:extLst>
+          </p:cNvPr>
           <p:cNvSpPr txBox="1"/>
           <p:nvPr/>
         </p:nvSpPr>
         <p:spPr>
           <a:xfrm>
-            <a:off x="2562367" y="961333"/>
-            <a:ext cx="1004184" cy="272565"/>
+            <a:off x="4249306" y="4171057"/>
+            <a:ext cx="1129678" cy="272565"/>
           </a:xfrm>
           <a:prstGeom prst="rect">
             <a:avLst/>
@@ -6686,193 +6480,789 @@
           </a:bodyPr>
           <a:lstStyle/>
           <a:p>
-            <a:pPr lvl="0"/>
-            <a:r>
-              <a:rPr lang="en" sz="1000" b="1" dirty="0" smtClean="0"/>
-              <a:t>H</a:t>
-            </a:r>
-            <a:r>
-              <a:rPr lang="en-US" altLang="zh-CN" sz="1000" b="1" dirty="0" smtClean="0"/>
-              <a:t>×W×2</a:t>
-            </a:r>
+            <a:r>
+              <a:rPr lang="en-US" altLang="zh-CN" sz="1000" b="1" dirty="0" err="1"/>
+              <a:t>Itensity</a:t>
+            </a:r>
+            <a:r>
+              <a:rPr lang="en-US" altLang="zh-CN" sz="1000" b="1" dirty="0"/>
+              <a:t> Feature</a:t>
+            </a:r>
+          </a:p>
+          <a:p>
             <a:endParaRPr sz="1000" b="1" dirty="0"/>
           </a:p>
         </p:txBody>
       </p:sp>
       <p:sp>
         <p:nvSpPr>
-          <p:cNvPr id="170" name="Google Shape;8410;p96"/>
-          <p:cNvSpPr txBox="1"/>
-          <p:nvPr/>
-        </p:nvSpPr>
-        <p:spPr>
-          <a:xfrm>
-            <a:off x="2083087" y="3496242"/>
-            <a:ext cx="1443889" cy="272565"/>
-          </a:xfrm>
-          <a:prstGeom prst="rect">
+          <p:cNvPr id="12" name="箭头: 右 11">
+            <a:extLst>
+              <a:ext uri="{FF2B5EF4-FFF2-40B4-BE49-F238E27FC236}">
+                <a16:creationId xmlns:a16="http://schemas.microsoft.com/office/drawing/2014/main" id="{ED13C348-9746-4C02-8E06-088B29B31B22}"/>
+              </a:ext>
+            </a:extLst>
+          </p:cNvPr>
+          <p:cNvSpPr/>
+          <p:nvPr/>
+        </p:nvSpPr>
+        <p:spPr>
+          <a:xfrm>
+            <a:off x="5330858" y="2173264"/>
+            <a:ext cx="385010" cy="192506"/>
+          </a:xfrm>
+          <a:prstGeom prst="rightArrow">
+            <a:avLst/>
+          </a:prstGeom>
+          <a:solidFill>
+            <a:schemeClr val="accent2">
+              <a:lumMod val="60000"/>
+              <a:lumOff val="40000"/>
+            </a:schemeClr>
+          </a:solidFill>
+          <a:ln>
+            <a:solidFill>
+              <a:schemeClr val="accent2"/>
+            </a:solidFill>
+          </a:ln>
+        </p:spPr>
+        <p:style>
+          <a:lnRef idx="2">
+            <a:schemeClr val="accent1">
+              <a:shade val="50000"/>
+            </a:schemeClr>
+          </a:lnRef>
+          <a:fillRef idx="1">
+            <a:schemeClr val="accent1"/>
+          </a:fillRef>
+          <a:effectRef idx="0">
+            <a:schemeClr val="accent1"/>
+          </a:effectRef>
+          <a:fontRef idx="minor">
+            <a:schemeClr val="lt1"/>
+          </a:fontRef>
+        </p:style>
+        <p:txBody>
+          <a:bodyPr rtlCol="0" anchor="ctr"/>
+          <a:lstStyle/>
+          <a:p>
+            <a:pPr algn="ctr"/>
+            <a:endParaRPr lang="zh-CN" altLang="en-US"/>
+          </a:p>
+        </p:txBody>
+      </p:sp>
+      <p:sp>
+        <p:nvSpPr>
+          <p:cNvPr id="60" name="箭头: 右 59">
+            <a:extLst>
+              <a:ext uri="{FF2B5EF4-FFF2-40B4-BE49-F238E27FC236}">
+                <a16:creationId xmlns:a16="http://schemas.microsoft.com/office/drawing/2014/main" id="{77DA17BA-46DA-48ED-9DD3-06E5633F3B81}"/>
+              </a:ext>
+            </a:extLst>
+          </p:cNvPr>
+          <p:cNvSpPr/>
+          <p:nvPr/>
+        </p:nvSpPr>
+        <p:spPr>
+          <a:xfrm>
+            <a:off x="6205152" y="2497264"/>
+            <a:ext cx="385010" cy="192506"/>
+          </a:xfrm>
+          <a:prstGeom prst="rightArrow">
+            <a:avLst/>
+          </a:prstGeom>
+          <a:solidFill>
+            <a:schemeClr val="accent2">
+              <a:lumMod val="60000"/>
+              <a:lumOff val="40000"/>
+            </a:schemeClr>
+          </a:solidFill>
+          <a:ln>
+            <a:solidFill>
+              <a:schemeClr val="accent2"/>
+            </a:solidFill>
+          </a:ln>
+        </p:spPr>
+        <p:style>
+          <a:lnRef idx="2">
+            <a:schemeClr val="accent1">
+              <a:shade val="50000"/>
+            </a:schemeClr>
+          </a:lnRef>
+          <a:fillRef idx="1">
+            <a:schemeClr val="accent1"/>
+          </a:fillRef>
+          <a:effectRef idx="0">
+            <a:schemeClr val="accent1"/>
+          </a:effectRef>
+          <a:fontRef idx="minor">
+            <a:schemeClr val="lt1"/>
+          </a:fontRef>
+        </p:style>
+        <p:txBody>
+          <a:bodyPr rtlCol="0" anchor="ctr"/>
+          <a:lstStyle/>
+          <a:p>
+            <a:pPr algn="ctr"/>
+            <a:endParaRPr lang="zh-CN" altLang="en-US"/>
+          </a:p>
+        </p:txBody>
+      </p:sp>
+      <p:sp>
+        <p:nvSpPr>
+          <p:cNvPr id="61" name="箭头: 右 60">
+            <a:extLst>
+              <a:ext uri="{FF2B5EF4-FFF2-40B4-BE49-F238E27FC236}">
+                <a16:creationId xmlns:a16="http://schemas.microsoft.com/office/drawing/2014/main" id="{18D03048-5BD6-4434-B5F3-74B5CD36C73F}"/>
+              </a:ext>
+            </a:extLst>
+          </p:cNvPr>
+          <p:cNvSpPr/>
+          <p:nvPr/>
+        </p:nvSpPr>
+        <p:spPr>
+          <a:xfrm>
+            <a:off x="7120698" y="2677264"/>
+            <a:ext cx="385010" cy="192506"/>
+          </a:xfrm>
+          <a:prstGeom prst="rightArrow">
+            <a:avLst/>
+          </a:prstGeom>
+          <a:solidFill>
+            <a:schemeClr val="accent2">
+              <a:lumMod val="60000"/>
+              <a:lumOff val="40000"/>
+            </a:schemeClr>
+          </a:solidFill>
+          <a:ln>
+            <a:solidFill>
+              <a:schemeClr val="accent2"/>
+            </a:solidFill>
+          </a:ln>
+        </p:spPr>
+        <p:style>
+          <a:lnRef idx="2">
+            <a:schemeClr val="accent1">
+              <a:shade val="50000"/>
+            </a:schemeClr>
+          </a:lnRef>
+          <a:fillRef idx="1">
+            <a:schemeClr val="accent1"/>
+          </a:fillRef>
+          <a:effectRef idx="0">
+            <a:schemeClr val="accent1"/>
+          </a:effectRef>
+          <a:fontRef idx="minor">
+            <a:schemeClr val="lt1"/>
+          </a:fontRef>
+        </p:style>
+        <p:txBody>
+          <a:bodyPr rtlCol="0" anchor="ctr"/>
+          <a:lstStyle/>
+          <a:p>
+            <a:pPr algn="ctr"/>
+            <a:endParaRPr lang="zh-CN" altLang="en-US"/>
+          </a:p>
+        </p:txBody>
+      </p:sp>
+      <p:sp>
+        <p:nvSpPr>
+          <p:cNvPr id="62" name="箭头: 右 61">
+            <a:extLst>
+              <a:ext uri="{FF2B5EF4-FFF2-40B4-BE49-F238E27FC236}">
+                <a16:creationId xmlns:a16="http://schemas.microsoft.com/office/drawing/2014/main" id="{EC547F98-FFD9-4F9D-8F32-A5600FE6ED91}"/>
+              </a:ext>
+            </a:extLst>
+          </p:cNvPr>
+          <p:cNvSpPr/>
+          <p:nvPr/>
+        </p:nvSpPr>
+        <p:spPr>
+          <a:xfrm>
+            <a:off x="8118746" y="2677264"/>
+            <a:ext cx="385010" cy="192506"/>
+          </a:xfrm>
+          <a:prstGeom prst="rightArrow">
+            <a:avLst/>
+          </a:prstGeom>
+          <a:solidFill>
+            <a:schemeClr val="accent2">
+              <a:lumMod val="60000"/>
+              <a:lumOff val="40000"/>
+            </a:schemeClr>
+          </a:solidFill>
+          <a:ln>
+            <a:solidFill>
+              <a:schemeClr val="accent2"/>
+            </a:solidFill>
+          </a:ln>
+        </p:spPr>
+        <p:style>
+          <a:lnRef idx="2">
+            <a:schemeClr val="accent1">
+              <a:shade val="50000"/>
+            </a:schemeClr>
+          </a:lnRef>
+          <a:fillRef idx="1">
+            <a:schemeClr val="accent1"/>
+          </a:fillRef>
+          <a:effectRef idx="0">
+            <a:schemeClr val="accent1"/>
+          </a:effectRef>
+          <a:fontRef idx="minor">
+            <a:schemeClr val="lt1"/>
+          </a:fontRef>
+        </p:style>
+        <p:txBody>
+          <a:bodyPr rtlCol="0" anchor="ctr"/>
+          <a:lstStyle/>
+          <a:p>
+            <a:pPr algn="ctr"/>
+            <a:endParaRPr lang="zh-CN" altLang="en-US"/>
+          </a:p>
+        </p:txBody>
+      </p:sp>
+      <p:sp>
+        <p:nvSpPr>
+          <p:cNvPr id="63" name="箭头: 右 62">
+            <a:extLst>
+              <a:ext uri="{FF2B5EF4-FFF2-40B4-BE49-F238E27FC236}">
+                <a16:creationId xmlns:a16="http://schemas.microsoft.com/office/drawing/2014/main" id="{330BF29A-BA66-478B-9512-5E058A45DD14}"/>
+              </a:ext>
+            </a:extLst>
+          </p:cNvPr>
+          <p:cNvSpPr/>
+          <p:nvPr/>
+        </p:nvSpPr>
+        <p:spPr>
+          <a:xfrm>
+            <a:off x="8931164" y="2497264"/>
+            <a:ext cx="385010" cy="192506"/>
+          </a:xfrm>
+          <a:prstGeom prst="rightArrow">
+            <a:avLst/>
+          </a:prstGeom>
+          <a:solidFill>
+            <a:schemeClr val="accent2">
+              <a:lumMod val="60000"/>
+              <a:lumOff val="40000"/>
+            </a:schemeClr>
+          </a:solidFill>
+          <a:ln>
+            <a:solidFill>
+              <a:schemeClr val="accent2"/>
+            </a:solidFill>
+          </a:ln>
+        </p:spPr>
+        <p:style>
+          <a:lnRef idx="2">
+            <a:schemeClr val="accent1">
+              <a:shade val="50000"/>
+            </a:schemeClr>
+          </a:lnRef>
+          <a:fillRef idx="1">
+            <a:schemeClr val="accent1"/>
+          </a:fillRef>
+          <a:effectRef idx="0">
+            <a:schemeClr val="accent1"/>
+          </a:effectRef>
+          <a:fontRef idx="minor">
+            <a:schemeClr val="lt1"/>
+          </a:fontRef>
+        </p:style>
+        <p:txBody>
+          <a:bodyPr rtlCol="0" anchor="ctr"/>
+          <a:lstStyle/>
+          <a:p>
+            <a:pPr algn="ctr"/>
+            <a:endParaRPr lang="zh-CN" altLang="en-US"/>
+          </a:p>
+        </p:txBody>
+      </p:sp>
+      <p:sp>
+        <p:nvSpPr>
+          <p:cNvPr id="64" name="箭头: 右 63">
+            <a:extLst>
+              <a:ext uri="{FF2B5EF4-FFF2-40B4-BE49-F238E27FC236}">
+                <a16:creationId xmlns:a16="http://schemas.microsoft.com/office/drawing/2014/main" id="{99506A75-778C-4EEF-93F6-555958159A11}"/>
+              </a:ext>
+            </a:extLst>
+          </p:cNvPr>
+          <p:cNvSpPr/>
+          <p:nvPr/>
+        </p:nvSpPr>
+        <p:spPr>
+          <a:xfrm>
+            <a:off x="9647329" y="2173264"/>
+            <a:ext cx="385010" cy="192506"/>
+          </a:xfrm>
+          <a:prstGeom prst="rightArrow">
+            <a:avLst/>
+          </a:prstGeom>
+          <a:solidFill>
+            <a:schemeClr val="accent2">
+              <a:lumMod val="60000"/>
+              <a:lumOff val="40000"/>
+            </a:schemeClr>
+          </a:solidFill>
+          <a:ln>
+            <a:solidFill>
+              <a:schemeClr val="accent2"/>
+            </a:solidFill>
+          </a:ln>
+        </p:spPr>
+        <p:style>
+          <a:lnRef idx="2">
+            <a:schemeClr val="accent1">
+              <a:shade val="50000"/>
+            </a:schemeClr>
+          </a:lnRef>
+          <a:fillRef idx="1">
+            <a:schemeClr val="accent1"/>
+          </a:fillRef>
+          <a:effectRef idx="0">
+            <a:schemeClr val="accent1"/>
+          </a:effectRef>
+          <a:fontRef idx="minor">
+            <a:schemeClr val="lt1"/>
+          </a:fontRef>
+        </p:style>
+        <p:txBody>
+          <a:bodyPr rtlCol="0" anchor="ctr"/>
+          <a:lstStyle/>
+          <a:p>
+            <a:pPr algn="ctr"/>
+            <a:endParaRPr lang="zh-CN" altLang="en-US"/>
+          </a:p>
+        </p:txBody>
+      </p:sp>
+      <p:sp>
+        <p:nvSpPr>
+          <p:cNvPr id="65" name="箭头: 右 64">
+            <a:extLst>
+              <a:ext uri="{FF2B5EF4-FFF2-40B4-BE49-F238E27FC236}">
+                <a16:creationId xmlns:a16="http://schemas.microsoft.com/office/drawing/2014/main" id="{FCD43224-C1B4-4EC8-A71E-46DC1905C7BE}"/>
+              </a:ext>
+            </a:extLst>
+          </p:cNvPr>
+          <p:cNvSpPr/>
+          <p:nvPr/>
+        </p:nvSpPr>
+        <p:spPr>
+          <a:xfrm>
+            <a:off x="5332004" y="3576948"/>
+            <a:ext cx="385010" cy="192506"/>
+          </a:xfrm>
+          <a:prstGeom prst="rightArrow">
+            <a:avLst/>
+          </a:prstGeom>
+          <a:solidFill>
+            <a:schemeClr val="accent6">
+              <a:lumMod val="40000"/>
+              <a:lumOff val="60000"/>
+            </a:schemeClr>
+          </a:solidFill>
+          <a:ln>
+            <a:solidFill>
+              <a:schemeClr val="accent6"/>
+            </a:solidFill>
+          </a:ln>
+        </p:spPr>
+        <p:style>
+          <a:lnRef idx="2">
+            <a:schemeClr val="accent1">
+              <a:shade val="50000"/>
+            </a:schemeClr>
+          </a:lnRef>
+          <a:fillRef idx="1">
+            <a:schemeClr val="accent1"/>
+          </a:fillRef>
+          <a:effectRef idx="0">
+            <a:schemeClr val="accent1"/>
+          </a:effectRef>
+          <a:fontRef idx="minor">
+            <a:schemeClr val="lt1"/>
+          </a:fontRef>
+        </p:style>
+        <p:txBody>
+          <a:bodyPr rtlCol="0" anchor="ctr"/>
+          <a:lstStyle/>
+          <a:p>
+            <a:pPr algn="ctr"/>
+            <a:endParaRPr lang="zh-CN" altLang="en-US"/>
+          </a:p>
+        </p:txBody>
+      </p:sp>
+      <p:sp>
+        <p:nvSpPr>
+          <p:cNvPr id="66" name="箭头: 右 65">
+            <a:extLst>
+              <a:ext uri="{FF2B5EF4-FFF2-40B4-BE49-F238E27FC236}">
+                <a16:creationId xmlns:a16="http://schemas.microsoft.com/office/drawing/2014/main" id="{B22C72BF-D9F7-4FC5-9E86-8CAFC821EF6E}"/>
+              </a:ext>
+            </a:extLst>
+          </p:cNvPr>
+          <p:cNvSpPr/>
+          <p:nvPr/>
+        </p:nvSpPr>
+        <p:spPr>
+          <a:xfrm>
+            <a:off x="6206298" y="3240930"/>
+            <a:ext cx="385010" cy="192506"/>
+          </a:xfrm>
+          <a:prstGeom prst="rightArrow">
+            <a:avLst/>
+          </a:prstGeom>
+          <a:solidFill>
+            <a:schemeClr val="accent6">
+              <a:lumMod val="40000"/>
+              <a:lumOff val="60000"/>
+            </a:schemeClr>
+          </a:solidFill>
+          <a:ln>
+            <a:solidFill>
+              <a:schemeClr val="accent6"/>
+            </a:solidFill>
+          </a:ln>
+        </p:spPr>
+        <p:style>
+          <a:lnRef idx="2">
+            <a:schemeClr val="accent1">
+              <a:shade val="50000"/>
+            </a:schemeClr>
+          </a:lnRef>
+          <a:fillRef idx="1">
+            <a:schemeClr val="accent1"/>
+          </a:fillRef>
+          <a:effectRef idx="0">
+            <a:schemeClr val="accent1"/>
+          </a:effectRef>
+          <a:fontRef idx="minor">
+            <a:schemeClr val="lt1"/>
+          </a:fontRef>
+        </p:style>
+        <p:txBody>
+          <a:bodyPr rtlCol="0" anchor="ctr"/>
+          <a:lstStyle/>
+          <a:p>
+            <a:pPr algn="ctr"/>
+            <a:endParaRPr lang="zh-CN" altLang="en-US"/>
+          </a:p>
+        </p:txBody>
+      </p:sp>
+      <p:sp>
+        <p:nvSpPr>
+          <p:cNvPr id="67" name="箭头: 右 66">
+            <a:extLst>
+              <a:ext uri="{FF2B5EF4-FFF2-40B4-BE49-F238E27FC236}">
+                <a16:creationId xmlns:a16="http://schemas.microsoft.com/office/drawing/2014/main" id="{4C77EBC5-FE6F-4968-956D-AAAC2AEF8EF5}"/>
+              </a:ext>
+            </a:extLst>
+          </p:cNvPr>
+          <p:cNvSpPr/>
+          <p:nvPr/>
+        </p:nvSpPr>
+        <p:spPr>
+          <a:xfrm>
+            <a:off x="7114969" y="3090921"/>
+            <a:ext cx="385010" cy="192506"/>
+          </a:xfrm>
+          <a:prstGeom prst="rightArrow">
+            <a:avLst/>
+          </a:prstGeom>
+          <a:solidFill>
+            <a:schemeClr val="accent6">
+              <a:lumMod val="40000"/>
+              <a:lumOff val="60000"/>
+            </a:schemeClr>
+          </a:solidFill>
+          <a:ln>
+            <a:solidFill>
+              <a:schemeClr val="accent6"/>
+            </a:solidFill>
+          </a:ln>
+        </p:spPr>
+        <p:style>
+          <a:lnRef idx="2">
+            <a:schemeClr val="accent1">
+              <a:shade val="50000"/>
+            </a:schemeClr>
+          </a:lnRef>
+          <a:fillRef idx="1">
+            <a:schemeClr val="accent1"/>
+          </a:fillRef>
+          <a:effectRef idx="0">
+            <a:schemeClr val="accent1"/>
+          </a:effectRef>
+          <a:fontRef idx="minor">
+            <a:schemeClr val="lt1"/>
+          </a:fontRef>
+        </p:style>
+        <p:txBody>
+          <a:bodyPr rtlCol="0" anchor="ctr"/>
+          <a:lstStyle/>
+          <a:p>
+            <a:pPr algn="ctr"/>
+            <a:endParaRPr lang="zh-CN" altLang="en-US"/>
+          </a:p>
+        </p:txBody>
+      </p:sp>
+      <p:sp>
+        <p:nvSpPr>
+          <p:cNvPr id="68" name="箭头: 右 67">
+            <a:extLst>
+              <a:ext uri="{FF2B5EF4-FFF2-40B4-BE49-F238E27FC236}">
+                <a16:creationId xmlns:a16="http://schemas.microsoft.com/office/drawing/2014/main" id="{BD50A3C2-2621-4A0C-8E31-D3C9EF05B1C6}"/>
+              </a:ext>
+            </a:extLst>
+          </p:cNvPr>
+          <p:cNvSpPr/>
+          <p:nvPr/>
+        </p:nvSpPr>
+        <p:spPr>
+          <a:xfrm>
+            <a:off x="8113017" y="3090921"/>
+            <a:ext cx="385010" cy="192506"/>
+          </a:xfrm>
+          <a:prstGeom prst="rightArrow">
+            <a:avLst/>
+          </a:prstGeom>
+          <a:solidFill>
+            <a:schemeClr val="accent6">
+              <a:lumMod val="40000"/>
+              <a:lumOff val="60000"/>
+            </a:schemeClr>
+          </a:solidFill>
+          <a:ln>
+            <a:solidFill>
+              <a:schemeClr val="accent6"/>
+            </a:solidFill>
+          </a:ln>
+        </p:spPr>
+        <p:style>
+          <a:lnRef idx="2">
+            <a:schemeClr val="accent1">
+              <a:shade val="50000"/>
+            </a:schemeClr>
+          </a:lnRef>
+          <a:fillRef idx="1">
+            <a:schemeClr val="accent1"/>
+          </a:fillRef>
+          <a:effectRef idx="0">
+            <a:schemeClr val="accent1"/>
+          </a:effectRef>
+          <a:fontRef idx="minor">
+            <a:schemeClr val="lt1"/>
+          </a:fontRef>
+        </p:style>
+        <p:txBody>
+          <a:bodyPr rtlCol="0" anchor="ctr"/>
+          <a:lstStyle/>
+          <a:p>
+            <a:pPr algn="ctr"/>
+            <a:endParaRPr lang="zh-CN" altLang="en-US"/>
+          </a:p>
+        </p:txBody>
+      </p:sp>
+      <p:sp>
+        <p:nvSpPr>
+          <p:cNvPr id="69" name="箭头: 右 68">
+            <a:extLst>
+              <a:ext uri="{FF2B5EF4-FFF2-40B4-BE49-F238E27FC236}">
+                <a16:creationId xmlns:a16="http://schemas.microsoft.com/office/drawing/2014/main" id="{439A6096-B953-4265-8601-AC4764B033D4}"/>
+              </a:ext>
+            </a:extLst>
+          </p:cNvPr>
+          <p:cNvSpPr/>
+          <p:nvPr/>
+        </p:nvSpPr>
+        <p:spPr>
+          <a:xfrm>
+            <a:off x="8932310" y="3240930"/>
+            <a:ext cx="385010" cy="192506"/>
+          </a:xfrm>
+          <a:prstGeom prst="rightArrow">
+            <a:avLst/>
+          </a:prstGeom>
+          <a:solidFill>
+            <a:schemeClr val="accent6">
+              <a:lumMod val="40000"/>
+              <a:lumOff val="60000"/>
+            </a:schemeClr>
+          </a:solidFill>
+          <a:ln>
+            <a:solidFill>
+              <a:schemeClr val="accent6"/>
+            </a:solidFill>
+          </a:ln>
+        </p:spPr>
+        <p:style>
+          <a:lnRef idx="2">
+            <a:schemeClr val="accent1">
+              <a:shade val="50000"/>
+            </a:schemeClr>
+          </a:lnRef>
+          <a:fillRef idx="1">
+            <a:schemeClr val="accent1"/>
+          </a:fillRef>
+          <a:effectRef idx="0">
+            <a:schemeClr val="accent1"/>
+          </a:effectRef>
+          <a:fontRef idx="minor">
+            <a:schemeClr val="lt1"/>
+          </a:fontRef>
+        </p:style>
+        <p:txBody>
+          <a:bodyPr rtlCol="0" anchor="ctr"/>
+          <a:lstStyle/>
+          <a:p>
+            <a:pPr algn="ctr"/>
+            <a:endParaRPr lang="zh-CN" altLang="en-US"/>
+          </a:p>
+        </p:txBody>
+      </p:sp>
+      <p:sp>
+        <p:nvSpPr>
+          <p:cNvPr id="70" name="箭头: 右 69">
+            <a:extLst>
+              <a:ext uri="{FF2B5EF4-FFF2-40B4-BE49-F238E27FC236}">
+                <a16:creationId xmlns:a16="http://schemas.microsoft.com/office/drawing/2014/main" id="{7BD3CDAD-562A-454C-849B-74B46A80651C}"/>
+              </a:ext>
+            </a:extLst>
+          </p:cNvPr>
+          <p:cNvSpPr/>
+          <p:nvPr/>
+        </p:nvSpPr>
+        <p:spPr>
+          <a:xfrm>
+            <a:off x="9648475" y="3576948"/>
+            <a:ext cx="385010" cy="192506"/>
+          </a:xfrm>
+          <a:prstGeom prst="rightArrow">
+            <a:avLst/>
+          </a:prstGeom>
+          <a:solidFill>
+            <a:schemeClr val="accent6">
+              <a:lumMod val="40000"/>
+              <a:lumOff val="60000"/>
+            </a:schemeClr>
+          </a:solidFill>
+          <a:ln>
+            <a:solidFill>
+              <a:schemeClr val="accent6"/>
+            </a:solidFill>
+          </a:ln>
+        </p:spPr>
+        <p:style>
+          <a:lnRef idx="2">
+            <a:schemeClr val="accent1">
+              <a:shade val="50000"/>
+            </a:schemeClr>
+          </a:lnRef>
+          <a:fillRef idx="1">
+            <a:schemeClr val="accent1"/>
+          </a:fillRef>
+          <a:effectRef idx="0">
+            <a:schemeClr val="accent1"/>
+          </a:effectRef>
+          <a:fontRef idx="minor">
+            <a:schemeClr val="lt1"/>
+          </a:fontRef>
+        </p:style>
+        <p:txBody>
+          <a:bodyPr rtlCol="0" anchor="ctr"/>
+          <a:lstStyle/>
+          <a:p>
+            <a:pPr algn="ctr"/>
+            <a:endParaRPr lang="zh-CN" altLang="en-US"/>
+          </a:p>
+        </p:txBody>
+      </p:sp>
+      <p:sp>
+        <p:nvSpPr>
+          <p:cNvPr id="13" name="矩形: 圆角 12">
+            <a:extLst>
+              <a:ext uri="{FF2B5EF4-FFF2-40B4-BE49-F238E27FC236}">
+                <a16:creationId xmlns:a16="http://schemas.microsoft.com/office/drawing/2014/main" id="{A45C6FD8-FD3C-404A-80CF-0679AF880BD2}"/>
+              </a:ext>
+            </a:extLst>
+          </p:cNvPr>
+          <p:cNvSpPr/>
+          <p:nvPr/>
+        </p:nvSpPr>
+        <p:spPr>
+          <a:xfrm>
+            <a:off x="1986547" y="1045029"/>
+            <a:ext cx="3279847" cy="4193864"/>
+          </a:xfrm>
+          <a:prstGeom prst="roundRect">
             <a:avLst/>
           </a:prstGeom>
           <a:noFill/>
-          <a:ln>
-            <a:noFill/>
+          <a:ln w="19050">
+            <a:solidFill>
+              <a:schemeClr val="tx1"/>
+            </a:solidFill>
+            <a:prstDash val="sysDash"/>
           </a:ln>
         </p:spPr>
-        <p:txBody>
-          <a:bodyPr spcFirstLastPara="1" wrap="square" lIns="91425" tIns="91425" rIns="91425" bIns="91425" anchor="t" anchorCtr="0">
-            <a:noAutofit/>
-          </a:bodyPr>
-          <a:lstStyle/>
-          <a:p>
-            <a:r>
-              <a:rPr lang="en-US" altLang="zh-CN" sz="1000" b="1" dirty="0" smtClean="0"/>
-              <a:t>Visible </a:t>
-            </a:r>
-            <a:r>
-              <a:rPr lang="en" sz="1000" b="1" dirty="0" smtClean="0"/>
-              <a:t>Itensity Map</a:t>
-            </a:r>
-            <a:endParaRPr sz="1000" b="1" dirty="0"/>
-          </a:p>
-        </p:txBody>
-      </p:sp>
-      <p:pic>
-        <p:nvPicPr>
-          <p:cNvPr id="171" name="图片 170"/>
-          <p:cNvPicPr>
-            <a:picLocks noChangeAspect="1"/>
-          </p:cNvPicPr>
-          <p:nvPr/>
-        </p:nvPicPr>
-        <p:blipFill>
-          <a:blip r:embed="rId5"/>
-          <a:stretch>
-            <a:fillRect/>
-          </a:stretch>
-        </p:blipFill>
-        <p:spPr>
-          <a:xfrm>
-            <a:off x="2223950" y="4533162"/>
-            <a:ext cx="1089879" cy="690257"/>
-          </a:xfrm>
-          <a:prstGeom prst="rect">
-            <a:avLst/>
-          </a:prstGeom>
-        </p:spPr>
-      </p:pic>
-      <p:sp>
-        <p:nvSpPr>
-          <p:cNvPr id="172" name="Google Shape;8410;p96"/>
-          <p:cNvSpPr txBox="1"/>
-          <p:nvPr/>
-        </p:nvSpPr>
-        <p:spPr>
-          <a:xfrm>
-            <a:off x="2154174" y="5233137"/>
-            <a:ext cx="1443889" cy="272565"/>
-          </a:xfrm>
-          <a:prstGeom prst="rect">
+        <p:style>
+          <a:lnRef idx="2">
+            <a:schemeClr val="accent1">
+              <a:shade val="50000"/>
+            </a:schemeClr>
+          </a:lnRef>
+          <a:fillRef idx="1">
+            <a:schemeClr val="accent1"/>
+          </a:fillRef>
+          <a:effectRef idx="0">
+            <a:schemeClr val="accent1"/>
+          </a:effectRef>
+          <a:fontRef idx="minor">
+            <a:schemeClr val="lt1"/>
+          </a:fontRef>
+        </p:style>
+        <p:txBody>
+          <a:bodyPr rtlCol="0" anchor="ctr"/>
+          <a:lstStyle/>
+          <a:p>
+            <a:pPr algn="ctr"/>
+            <a:endParaRPr lang="zh-CN" altLang="en-US"/>
+          </a:p>
+        </p:txBody>
+      </p:sp>
+      <p:cxnSp>
+        <p:nvCxnSpPr>
+          <p:cNvPr id="72" name="Google Shape;10001;p124">
+            <a:extLst>
+              <a:ext uri="{FF2B5EF4-FFF2-40B4-BE49-F238E27FC236}">
+                <a16:creationId xmlns:a16="http://schemas.microsoft.com/office/drawing/2014/main" id="{D591D5C1-EF21-4CC9-9D11-CDE5C0094465}"/>
+              </a:ext>
+            </a:extLst>
+          </p:cNvPr>
+          <p:cNvCxnSpPr/>
+          <p:nvPr/>
+        </p:nvCxnSpPr>
+        <p:spPr>
+          <a:xfrm>
+            <a:off x="1577239" y="2823103"/>
+            <a:ext cx="533269" cy="0"/>
+          </a:xfrm>
+          <a:prstGeom prst="straightConnector1">
             <a:avLst/>
           </a:prstGeom>
           <a:noFill/>
-          <a:ln>
-            <a:noFill/>
+          <a:ln w="19050" cap="flat" cmpd="sng">
+            <a:solidFill>
+              <a:srgbClr val="000000"/>
+            </a:solidFill>
+            <a:prstDash val="solid"/>
+            <a:round/>
+            <a:headEnd type="none" w="med" len="med"/>
+            <a:tailEnd type="triangle" w="med" len="med"/>
           </a:ln>
         </p:spPr>
-        <p:txBody>
-          <a:bodyPr spcFirstLastPara="1" wrap="square" lIns="91425" tIns="91425" rIns="91425" bIns="91425" anchor="t" anchorCtr="0">
-            <a:noAutofit/>
-          </a:bodyPr>
-          <a:lstStyle/>
-          <a:p>
-            <a:r>
-              <a:rPr lang="en-US" altLang="zh-CN" sz="1000" b="1" dirty="0" smtClean="0"/>
-              <a:t>Infrared </a:t>
-            </a:r>
-            <a:r>
-              <a:rPr lang="en" sz="1000" b="1" dirty="0" smtClean="0"/>
-              <a:t>Itensity Map</a:t>
-            </a:r>
-            <a:endParaRPr sz="1000" b="1" dirty="0"/>
-          </a:p>
-        </p:txBody>
-      </p:sp>
-      <p:sp>
-        <p:nvSpPr>
-          <p:cNvPr id="173" name="Google Shape;8410;p96"/>
-          <p:cNvSpPr txBox="1"/>
-          <p:nvPr/>
-        </p:nvSpPr>
-        <p:spPr>
-          <a:xfrm>
-            <a:off x="2437182" y="2466500"/>
-            <a:ext cx="1004184" cy="272565"/>
-          </a:xfrm>
-          <a:prstGeom prst="rect">
-            <a:avLst/>
-          </a:prstGeom>
-          <a:noFill/>
-          <a:ln>
-            <a:noFill/>
-          </a:ln>
-        </p:spPr>
-        <p:txBody>
-          <a:bodyPr spcFirstLastPara="1" wrap="square" lIns="91425" tIns="91425" rIns="91425" bIns="91425" anchor="t" anchorCtr="0">
-            <a:noAutofit/>
-          </a:bodyPr>
-          <a:lstStyle/>
-          <a:p>
-            <a:pPr lvl="0"/>
-            <a:r>
-              <a:rPr lang="en" sz="1000" b="1" dirty="0" smtClean="0"/>
-              <a:t>H</a:t>
-            </a:r>
-            <a:r>
-              <a:rPr lang="en-US" altLang="zh-CN" sz="1000" b="1" dirty="0" smtClean="0"/>
-              <a:t>×W×1</a:t>
-            </a:r>
-            <a:endParaRPr sz="1000" b="1" dirty="0"/>
-          </a:p>
-        </p:txBody>
-      </p:sp>
-      <p:sp>
-        <p:nvSpPr>
-          <p:cNvPr id="174" name="Google Shape;8410;p96"/>
-          <p:cNvSpPr txBox="1"/>
-          <p:nvPr/>
-        </p:nvSpPr>
-        <p:spPr>
-          <a:xfrm>
-            <a:off x="2462532" y="4192311"/>
-            <a:ext cx="1004184" cy="272565"/>
-          </a:xfrm>
-          <a:prstGeom prst="rect">
-            <a:avLst/>
-          </a:prstGeom>
-          <a:noFill/>
-          <a:ln>
-            <a:noFill/>
-          </a:ln>
-        </p:spPr>
-        <p:txBody>
-          <a:bodyPr spcFirstLastPara="1" wrap="square" lIns="91425" tIns="91425" rIns="91425" bIns="91425" anchor="t" anchorCtr="0">
-            <a:noAutofit/>
-          </a:bodyPr>
-          <a:lstStyle/>
-          <a:p>
-            <a:pPr lvl="0"/>
-            <a:r>
-              <a:rPr lang="en" sz="1000" b="1" dirty="0" smtClean="0"/>
-              <a:t>H</a:t>
-            </a:r>
-            <a:r>
-              <a:rPr lang="en-US" altLang="zh-CN" sz="1000" b="1" dirty="0" smtClean="0"/>
-              <a:t>×W×1</a:t>
-            </a:r>
-            <a:endParaRPr sz="1000" b="1" dirty="0"/>
-          </a:p>
-        </p:txBody>
-      </p:sp>
+      </p:cxnSp>
     </p:spTree>
     <p:extLst>
       <p:ext uri="{BB962C8B-B14F-4D97-AF65-F5344CB8AC3E}">
@@ -7125,7 +7515,7 @@
           <a:p>
             <a:pPr lvl="0"/>
             <a:r>
-              <a:rPr lang="en-US" sz="1000" b="1" dirty="0" smtClean="0"/>
+              <a:rPr lang="en-US" sz="1000" b="1" dirty="0"/>
               <a:t>Infrared</a:t>
             </a:r>
             <a:endParaRPr sz="1000" b="1" dirty="0"/>
@@ -7159,7 +7549,7 @@
           <a:p>
             <a:pPr lvl="0"/>
             <a:r>
-              <a:rPr lang="en-US" sz="1000" b="1" dirty="0" smtClean="0"/>
+              <a:rPr lang="en-US" sz="1000" b="1" dirty="0"/>
               <a:t>Visible</a:t>
             </a:r>
             <a:endParaRPr sz="1000" b="1" dirty="0"/>
@@ -7193,7 +7583,7 @@
           <a:p>
             <a:pPr lvl="0"/>
             <a:r>
-              <a:rPr lang="en-US" sz="1000" b="1" dirty="0" smtClean="0"/>
+              <a:rPr lang="en-US" sz="1000" b="1" dirty="0"/>
               <a:t>EMMA</a:t>
             </a:r>
             <a:endParaRPr sz="1000" b="1" dirty="0"/>
@@ -7292,7 +7682,7 @@
           <a:p>
             <a:pPr lvl="0"/>
             <a:r>
-              <a:rPr lang="en-US" sz="1000" b="1" dirty="0" smtClean="0"/>
+              <a:rPr lang="en-US" sz="1000" b="1" dirty="0"/>
               <a:t>EMMA</a:t>
             </a:r>
             <a:endParaRPr sz="1000" b="1" dirty="0"/>
@@ -7391,7 +7781,7 @@
           <a:p>
             <a:pPr lvl="0"/>
             <a:r>
-              <a:rPr lang="en-US" sz="1000" b="1" dirty="0" smtClean="0"/>
+              <a:rPr lang="en-US" sz="1000" b="1" dirty="0"/>
               <a:t>EMMA</a:t>
             </a:r>
             <a:endParaRPr sz="1000" b="1" dirty="0"/>
@@ -7490,7 +7880,7 @@
           <a:p>
             <a:pPr lvl="0"/>
             <a:r>
-              <a:rPr lang="en-US" sz="1000" b="1" dirty="0" smtClean="0"/>
+              <a:rPr lang="en-US" sz="1000" b="1" dirty="0"/>
               <a:t>EMMA</a:t>
             </a:r>
             <a:endParaRPr sz="1000" b="1" dirty="0"/>
@@ -7719,7 +8109,7 @@
           <a:p>
             <a:pPr lvl="0"/>
             <a:r>
-              <a:rPr lang="en-US" sz="1000" b="1" dirty="0" smtClean="0"/>
+              <a:rPr lang="en-US" sz="1000" b="1" dirty="0"/>
               <a:t>Infrared</a:t>
             </a:r>
             <a:endParaRPr sz="1000" b="1" dirty="0"/>
@@ -7753,7 +8143,7 @@
           <a:p>
             <a:pPr lvl="0"/>
             <a:r>
-              <a:rPr lang="en-US" sz="1000" b="1" dirty="0" smtClean="0"/>
+              <a:rPr lang="en-US" sz="1000" b="1" dirty="0"/>
               <a:t>Visible</a:t>
             </a:r>
             <a:endParaRPr sz="1000" b="1" dirty="0"/>
@@ -7787,7 +8177,7 @@
           <a:p>
             <a:pPr lvl="0"/>
             <a:r>
-              <a:rPr lang="en-US" sz="1000" b="1" dirty="0" smtClean="0"/>
+              <a:rPr lang="en-US" sz="1000" b="1" dirty="0"/>
               <a:t>EMMA</a:t>
             </a:r>
             <a:endParaRPr sz="1000" b="1" dirty="0"/>
@@ -7886,7 +8276,7 @@
           <a:p>
             <a:pPr lvl="0"/>
             <a:r>
-              <a:rPr lang="en-US" sz="1000" b="1" dirty="0" smtClean="0"/>
+              <a:rPr lang="en-US" sz="1000" b="1" dirty="0"/>
               <a:t>EMMA</a:t>
             </a:r>
             <a:endParaRPr sz="1000" b="1" dirty="0"/>
@@ -7985,7 +8375,7 @@
           <a:p>
             <a:pPr lvl="0"/>
             <a:r>
-              <a:rPr lang="en-US" sz="1000" b="1" dirty="0" smtClean="0"/>
+              <a:rPr lang="en-US" sz="1000" b="1" dirty="0"/>
               <a:t>EMMA</a:t>
             </a:r>
             <a:endParaRPr sz="1000" b="1" dirty="0"/>
@@ -8084,7 +8474,7 @@
           <a:p>
             <a:pPr lvl="0"/>
             <a:r>
-              <a:rPr lang="en-US" sz="1000" b="1" dirty="0" smtClean="0"/>
+              <a:rPr lang="en-US" sz="1000" b="1" dirty="0"/>
               <a:t>Ours</a:t>
             </a:r>
             <a:endParaRPr sz="1000" b="1" dirty="0"/>

</xml_diff>